<commit_message>
update slides with tags
</commit_message>
<xml_diff>
--- a/docs/cs207-presentation.pptx
+++ b/docs/cs207-presentation.pptx
@@ -8,13 +8,14 @@
     <p:sldId id="256" r:id="rId2"/>
     <p:sldId id="259" r:id="rId3"/>
     <p:sldId id="258" r:id="rId4"/>
-    <p:sldId id="260" r:id="rId5"/>
-    <p:sldId id="266" r:id="rId6"/>
-    <p:sldId id="262" r:id="rId7"/>
-    <p:sldId id="261" r:id="rId8"/>
-    <p:sldId id="263" r:id="rId9"/>
-    <p:sldId id="267" r:id="rId10"/>
-    <p:sldId id="257" r:id="rId11"/>
+    <p:sldId id="268" r:id="rId5"/>
+    <p:sldId id="260" r:id="rId6"/>
+    <p:sldId id="266" r:id="rId7"/>
+    <p:sldId id="262" r:id="rId8"/>
+    <p:sldId id="261" r:id="rId9"/>
+    <p:sldId id="263" r:id="rId10"/>
+    <p:sldId id="267" r:id="rId11"/>
+    <p:sldId id="257" r:id="rId12"/>
   </p:sldIdLst>
   <p:sldSz cx="12192000" cy="6858000"/>
   <p:notesSz cx="6858000" cy="9144000"/>
@@ -113,6 +114,11 @@
       </a:defRPr>
     </a:lvl9pPr>
   </p:defaultTextStyle>
+  <p:extLst>
+    <p:ext uri="{EFAFB233-063F-42B5-8137-9DF3F51BA10A}">
+      <p15:sldGuideLst xmlns:p15="http://schemas.microsoft.com/office/powerpoint/2012/main"/>
+    </p:ext>
+  </p:extLst>
 </p:presentation>
 </file>
 
@@ -585,7 +591,7 @@
           <a:p>
             <a:fld id="{EA0C0817-A112-4847-8014-A94B7D2A4EA3}" type="datetime1">
               <a:rPr lang="en-US" smtClean="0"/>
-              <a:t>12/5/19</a:t>
+              <a:t>12/6/19</a:t>
             </a:fld>
             <a:endParaRPr lang="en-US" dirty="0"/>
           </a:p>
@@ -787,7 +793,7 @@
           <a:p>
             <a:fld id="{134F40B7-36AB-4376-BE14-EF7004D79BB9}" type="datetime1">
               <a:rPr lang="en-US" smtClean="0"/>
-              <a:t>12/5/19</a:t>
+              <a:t>12/6/19</a:t>
             </a:fld>
             <a:endParaRPr lang="en-US" dirty="0"/>
           </a:p>
@@ -967,7 +973,7 @@
           <a:p>
             <a:fld id="{FF87CAB8-DCAE-46A5-AADA-B3FAD11A54E0}" type="datetime1">
               <a:rPr lang="en-US" smtClean="0"/>
-              <a:t>12/5/19</a:t>
+              <a:t>12/6/19</a:t>
             </a:fld>
             <a:endParaRPr lang="en-US" dirty="0"/>
           </a:p>
@@ -1137,7 +1143,7 @@
           <a:p>
             <a:fld id="{7332B432-ACDA-4023-A761-2BAB76577B62}" type="datetime1">
               <a:rPr lang="en-US" smtClean="0"/>
-              <a:t>12/5/19</a:t>
+              <a:t>12/6/19</a:t>
             </a:fld>
             <a:endParaRPr lang="en-US" dirty="0"/>
           </a:p>
@@ -1736,7 +1742,7 @@
           <a:p>
             <a:fld id="{D9C646AA-F36E-4540-911D-FFFC0A0EF24A}" type="datetime1">
               <a:rPr lang="en-US" smtClean="0"/>
-              <a:t>12/5/19</a:t>
+              <a:t>12/6/19</a:t>
             </a:fld>
             <a:endParaRPr lang="en-US" dirty="0"/>
           </a:p>
@@ -2056,7 +2062,7 @@
           <a:p>
             <a:fld id="{69186D26-FA5F-4637-B602-B7C2DC34CFD4}" type="datetime1">
               <a:rPr lang="en-US" smtClean="0"/>
-              <a:t>12/5/19</a:t>
+              <a:t>12/6/19</a:t>
             </a:fld>
             <a:endParaRPr lang="en-US" dirty="0"/>
           </a:p>
@@ -2491,7 +2497,7 @@
           <a:p>
             <a:fld id="{8A7F15D8-96D1-4781-BC50-CA8A088B2FE4}" type="datetime1">
               <a:rPr lang="en-US" smtClean="0"/>
-              <a:t>12/5/19</a:t>
+              <a:t>12/6/19</a:t>
             </a:fld>
             <a:endParaRPr lang="en-US" dirty="0"/>
           </a:p>
@@ -2609,7 +2615,7 @@
           <a:p>
             <a:fld id="{F9A96C99-B8F8-4528-BD05-0E16E943DC09}" type="datetime1">
               <a:rPr lang="en-US" smtClean="0"/>
-              <a:t>12/5/19</a:t>
+              <a:t>12/6/19</a:t>
             </a:fld>
             <a:endParaRPr lang="en-US" dirty="0"/>
           </a:p>
@@ -2704,7 +2710,7 @@
           <a:p>
             <a:fld id="{03636942-C211-4B28-8DBD-C953E00AF71B}" type="datetime1">
               <a:rPr lang="en-US" smtClean="0"/>
-              <a:t>12/5/19</a:t>
+              <a:t>12/6/19</a:t>
             </a:fld>
             <a:endParaRPr lang="en-US" dirty="0"/>
           </a:p>
@@ -3121,7 +3127,7 @@
           <a:p>
             <a:fld id="{7E8D12A6-918A-48BD-8CB9-CA713993B0EA}" type="datetime1">
               <a:rPr lang="en-US" smtClean="0"/>
-              <a:t>12/5/19</a:t>
+              <a:t>12/6/19</a:t>
             </a:fld>
             <a:endParaRPr lang="en-US" dirty="0"/>
           </a:p>
@@ -3382,7 +3388,7 @@
             <a:fld id="{E778CE86-875F-4587-BCF6-FA054AFC0D53}" type="datetime1">
               <a:rPr lang="en-US" smtClean="0"/>
               <a:pPr/>
-              <a:t>12/5/19</a:t>
+              <a:t>12/6/19</a:t>
             </a:fld>
             <a:endParaRPr lang="en-US" dirty="0"/>
           </a:p>
@@ -3898,7 +3904,7 @@
           <a:p>
             <a:fld id="{F6FA2B21-3FCD-4721-B95C-427943F61125}" type="datetime1">
               <a:rPr lang="en-US" smtClean="0"/>
-              <a:t>12/5/19</a:t>
+              <a:t>12/6/19</a:t>
             </a:fld>
             <a:endParaRPr lang="en-US" dirty="0"/>
           </a:p>
@@ -4882,6 +4888,159 @@
 <file path=ppt/slides/slide10.xml><?xml version="1.0" encoding="utf-8"?>
 <p:sld xmlns:a="http://schemas.openxmlformats.org/drawingml/2006/main" xmlns:r="http://schemas.openxmlformats.org/officeDocument/2006/relationships" xmlns:p="http://schemas.openxmlformats.org/presentationml/2006/main">
   <p:cSld>
+    <p:spTree>
+      <p:nvGrpSpPr>
+        <p:cNvPr id="1" name=""/>
+        <p:cNvGrpSpPr/>
+        <p:nvPr/>
+      </p:nvGrpSpPr>
+      <p:grpSpPr>
+        <a:xfrm>
+          <a:off x="0" y="0"/>
+          <a:ext cx="0" cy="0"/>
+          <a:chOff x="0" y="0"/>
+          <a:chExt cx="0" cy="0"/>
+        </a:xfrm>
+      </p:grpSpPr>
+      <p:sp>
+        <p:nvSpPr>
+          <p:cNvPr id="2" name="Title 1">
+            <a:extLst>
+              <a:ext uri="{FF2B5EF4-FFF2-40B4-BE49-F238E27FC236}">
+                <a16:creationId xmlns:a16="http://schemas.microsoft.com/office/drawing/2014/main" id="{95589287-AF11-704C-81C5-4585F66010A7}"/>
+              </a:ext>
+            </a:extLst>
+          </p:cNvPr>
+          <p:cNvSpPr>
+            <a:spLocks noGrp="1"/>
+          </p:cNvSpPr>
+          <p:nvPr>
+            <p:ph type="title"/>
+          </p:nvPr>
+        </p:nvSpPr>
+        <p:spPr/>
+        <p:txBody>
+          <a:bodyPr/>
+          <a:lstStyle/>
+          <a:p>
+            <a:r>
+              <a:rPr lang="en-US" altLang="zh-CN" dirty="0">
+                <a:latin typeface="Times New Roman" panose="02020603050405020304" pitchFamily="18" charset="0"/>
+                <a:cs typeface="Times New Roman" panose="02020603050405020304" pitchFamily="18" charset="0"/>
+              </a:rPr>
+              <a:t>Future</a:t>
+            </a:r>
+            <a:r>
+              <a:rPr lang="zh-CN" altLang="en-US" dirty="0">
+                <a:latin typeface="Times New Roman" panose="02020603050405020304" pitchFamily="18" charset="0"/>
+                <a:cs typeface="Times New Roman" panose="02020603050405020304" pitchFamily="18" charset="0"/>
+              </a:rPr>
+              <a:t> </a:t>
+            </a:r>
+            <a:r>
+              <a:rPr lang="en-US" altLang="zh-CN" dirty="0">
+                <a:latin typeface="Times New Roman" panose="02020603050405020304" pitchFamily="18" charset="0"/>
+                <a:cs typeface="Times New Roman" panose="02020603050405020304" pitchFamily="18" charset="0"/>
+              </a:rPr>
+              <a:t>extensions</a:t>
+            </a:r>
+            <a:endParaRPr lang="en-US" dirty="0">
+              <a:latin typeface="Times New Roman" panose="02020603050405020304" pitchFamily="18" charset="0"/>
+              <a:cs typeface="Times New Roman" panose="02020603050405020304" pitchFamily="18" charset="0"/>
+            </a:endParaRPr>
+          </a:p>
+        </p:txBody>
+      </p:sp>
+      <p:sp>
+        <p:nvSpPr>
+          <p:cNvPr id="3" name="Content Placeholder 2">
+            <a:extLst>
+              <a:ext uri="{FF2B5EF4-FFF2-40B4-BE49-F238E27FC236}">
+                <a16:creationId xmlns:a16="http://schemas.microsoft.com/office/drawing/2014/main" id="{783E8868-7E39-C445-AF4E-AFEA995FD1B2}"/>
+              </a:ext>
+            </a:extLst>
+          </p:cNvPr>
+          <p:cNvSpPr>
+            <a:spLocks noGrp="1"/>
+          </p:cNvSpPr>
+          <p:nvPr>
+            <p:ph idx="1"/>
+          </p:nvPr>
+        </p:nvSpPr>
+        <p:spPr/>
+        <p:txBody>
+          <a:bodyPr/>
+          <a:lstStyle/>
+          <a:p>
+            <a:endParaRPr lang="en-US" dirty="0"/>
+          </a:p>
+        </p:txBody>
+      </p:sp>
+      <p:sp>
+        <p:nvSpPr>
+          <p:cNvPr id="4" name="Rectangle 3">
+            <a:extLst>
+              <a:ext uri="{FF2B5EF4-FFF2-40B4-BE49-F238E27FC236}">
+                <a16:creationId xmlns:a16="http://schemas.microsoft.com/office/drawing/2014/main" id="{C608A252-8638-D449-93A2-17A2187F1C57}"/>
+              </a:ext>
+            </a:extLst>
+          </p:cNvPr>
+          <p:cNvSpPr/>
+          <p:nvPr/>
+        </p:nvSpPr>
+        <p:spPr>
+          <a:xfrm>
+            <a:off x="10195560" y="642594"/>
+            <a:ext cx="1428750" cy="568986"/>
+          </a:xfrm>
+          <a:prstGeom prst="rect">
+            <a:avLst/>
+          </a:prstGeom>
+        </p:spPr>
+        <p:style>
+          <a:lnRef idx="2">
+            <a:schemeClr val="accent1">
+              <a:shade val="50000"/>
+            </a:schemeClr>
+          </a:lnRef>
+          <a:fillRef idx="1">
+            <a:schemeClr val="accent1"/>
+          </a:fillRef>
+          <a:effectRef idx="0">
+            <a:schemeClr val="accent1"/>
+          </a:effectRef>
+          <a:fontRef idx="minor">
+            <a:schemeClr val="lt1"/>
+          </a:fontRef>
+        </p:style>
+        <p:txBody>
+          <a:bodyPr rtlCol="0" anchor="ctr"/>
+          <a:lstStyle/>
+          <a:p>
+            <a:pPr algn="ctr"/>
+            <a:r>
+              <a:rPr lang="en-US" altLang="zh-CN" dirty="0"/>
+              <a:t>D</a:t>
+            </a:r>
+          </a:p>
+        </p:txBody>
+      </p:sp>
+    </p:spTree>
+    <p:extLst>
+      <p:ext uri="{BB962C8B-B14F-4D97-AF65-F5344CB8AC3E}">
+        <p14:creationId xmlns:p14="http://schemas.microsoft.com/office/powerpoint/2010/main" val="663471589"/>
+      </p:ext>
+    </p:extLst>
+  </p:cSld>
+  <p:clrMapOvr>
+    <a:masterClrMapping/>
+  </p:clrMapOvr>
+</p:sld>
+</file>
+
+<file path=ppt/slides/slide11.xml><?xml version="1.0" encoding="utf-8"?>
+<p:sld xmlns:a="http://schemas.openxmlformats.org/drawingml/2006/main" xmlns:r="http://schemas.openxmlformats.org/officeDocument/2006/relationships" xmlns:p="http://schemas.openxmlformats.org/presentationml/2006/main">
+  <p:cSld>
     <p:bg>
       <p:bgPr>
         <a:blipFill dpi="0" rotWithShape="1">
@@ -6277,6 +6436,55 @@
               <a:buNone/>
             </a:pPr>
             <a:endParaRPr lang="en-US" dirty="0"/>
+          </a:p>
+        </p:txBody>
+      </p:sp>
+      <p:sp>
+        <p:nvSpPr>
+          <p:cNvPr id="4" name="Rectangle 3">
+            <a:extLst>
+              <a:ext uri="{FF2B5EF4-FFF2-40B4-BE49-F238E27FC236}">
+                <a16:creationId xmlns:a16="http://schemas.microsoft.com/office/drawing/2014/main" id="{017CD6B5-6F22-C244-BBBD-319C707884ED}"/>
+              </a:ext>
+            </a:extLst>
+          </p:cNvPr>
+          <p:cNvSpPr/>
+          <p:nvPr/>
+        </p:nvSpPr>
+        <p:spPr>
+          <a:xfrm>
+            <a:off x="10195560" y="642594"/>
+            <a:ext cx="1428750" cy="568986"/>
+          </a:xfrm>
+          <a:prstGeom prst="rect">
+            <a:avLst/>
+          </a:prstGeom>
+        </p:spPr>
+        <p:style>
+          <a:lnRef idx="2">
+            <a:schemeClr val="accent1">
+              <a:shade val="50000"/>
+            </a:schemeClr>
+          </a:lnRef>
+          <a:fillRef idx="1">
+            <a:schemeClr val="accent1"/>
+          </a:fillRef>
+          <a:effectRef idx="0">
+            <a:schemeClr val="accent1"/>
+          </a:effectRef>
+          <a:fontRef idx="minor">
+            <a:schemeClr val="lt1"/>
+          </a:fontRef>
+        </p:style>
+        <p:txBody>
+          <a:bodyPr rtlCol="0" anchor="ctr"/>
+          <a:lstStyle/>
+          <a:p>
+            <a:pPr algn="ctr"/>
+            <a:r>
+              <a:rPr lang="en-US" altLang="zh-CN" dirty="0"/>
+              <a:t>R</a:t>
+            </a:r>
           </a:p>
         </p:txBody>
       </p:sp>
@@ -6924,6 +7132,55 @@
           </a:prstGeom>
         </p:spPr>
       </p:pic>
+      <p:sp>
+        <p:nvSpPr>
+          <p:cNvPr id="6" name="Rectangle 5">
+            <a:extLst>
+              <a:ext uri="{FF2B5EF4-FFF2-40B4-BE49-F238E27FC236}">
+                <a16:creationId xmlns:a16="http://schemas.microsoft.com/office/drawing/2014/main" id="{040B67FF-8D3F-F243-919E-AEBA13BFE3E4}"/>
+              </a:ext>
+            </a:extLst>
+          </p:cNvPr>
+          <p:cNvSpPr/>
+          <p:nvPr/>
+        </p:nvSpPr>
+        <p:spPr>
+          <a:xfrm>
+            <a:off x="10195560" y="642594"/>
+            <a:ext cx="1428750" cy="568986"/>
+          </a:xfrm>
+          <a:prstGeom prst="rect">
+            <a:avLst/>
+          </a:prstGeom>
+        </p:spPr>
+        <p:style>
+          <a:lnRef idx="2">
+            <a:schemeClr val="accent1">
+              <a:shade val="50000"/>
+            </a:schemeClr>
+          </a:lnRef>
+          <a:fillRef idx="1">
+            <a:schemeClr val="accent1"/>
+          </a:fillRef>
+          <a:effectRef idx="0">
+            <a:schemeClr val="accent1"/>
+          </a:effectRef>
+          <a:fontRef idx="minor">
+            <a:schemeClr val="lt1"/>
+          </a:fontRef>
+        </p:style>
+        <p:txBody>
+          <a:bodyPr rtlCol="0" anchor="ctr"/>
+          <a:lstStyle/>
+          <a:p>
+            <a:pPr algn="ctr"/>
+            <a:r>
+              <a:rPr lang="en-US" altLang="zh-CN" dirty="0"/>
+              <a:t>R</a:t>
+            </a:r>
+          </a:p>
+        </p:txBody>
+      </p:sp>
     </p:spTree>
     <p:extLst>
       <p:ext uri="{BB962C8B-B14F-4D97-AF65-F5344CB8AC3E}">
@@ -6959,7 +7216,7 @@
           <p:cNvPr id="2" name="Title 1">
             <a:extLst>
               <a:ext uri="{FF2B5EF4-FFF2-40B4-BE49-F238E27FC236}">
-                <a16:creationId xmlns:a16="http://schemas.microsoft.com/office/drawing/2014/main" id="{95B23324-E895-1C42-BF37-BF602B03E7FB}"/>
+                <a16:creationId xmlns:a16="http://schemas.microsoft.com/office/drawing/2014/main" id="{0F44C2C1-C03E-AA47-AA23-E6AAE5E36FC1}"/>
               </a:ext>
             </a:extLst>
           </p:cNvPr>
@@ -6976,100 +7233,34 @@
           <a:lstStyle/>
           <a:p>
             <a:r>
-              <a:rPr lang="en-US" altLang="zh-CN" dirty="0">
-                <a:latin typeface="Times New Roman" panose="02020603050405020304" pitchFamily="18" charset="0"/>
-                <a:cs typeface="Times New Roman" panose="02020603050405020304" pitchFamily="18" charset="0"/>
-              </a:rPr>
-              <a:t>How</a:t>
-            </a:r>
-            <a:r>
-              <a:rPr lang="zh-CN" altLang="en-US" dirty="0">
-                <a:latin typeface="Times New Roman" panose="02020603050405020304" pitchFamily="18" charset="0"/>
-                <a:cs typeface="Times New Roman" panose="02020603050405020304" pitchFamily="18" charset="0"/>
-              </a:rPr>
-              <a:t> </a:t>
-            </a:r>
-            <a:r>
-              <a:rPr lang="en-US" altLang="zh-CN" dirty="0">
-                <a:latin typeface="Times New Roman" panose="02020603050405020304" pitchFamily="18" charset="0"/>
-                <a:cs typeface="Times New Roman" panose="02020603050405020304" pitchFamily="18" charset="0"/>
-              </a:rPr>
-              <a:t>to</a:t>
-            </a:r>
-            <a:r>
-              <a:rPr lang="zh-CN" altLang="en-US" dirty="0">
-                <a:latin typeface="Times New Roman" panose="02020603050405020304" pitchFamily="18" charset="0"/>
-                <a:cs typeface="Times New Roman" panose="02020603050405020304" pitchFamily="18" charset="0"/>
-              </a:rPr>
-              <a:t> </a:t>
-            </a:r>
-            <a:r>
-              <a:rPr lang="en-US" altLang="zh-CN" dirty="0">
-                <a:latin typeface="Times New Roman" panose="02020603050405020304" pitchFamily="18" charset="0"/>
-                <a:cs typeface="Times New Roman" panose="02020603050405020304" pitchFamily="18" charset="0"/>
-              </a:rPr>
-              <a:t>Use</a:t>
-            </a:r>
-            <a:r>
-              <a:rPr lang="zh-CN" altLang="en-US" dirty="0">
-                <a:latin typeface="Times New Roman" panose="02020603050405020304" pitchFamily="18" charset="0"/>
-                <a:cs typeface="Times New Roman" panose="02020603050405020304" pitchFamily="18" charset="0"/>
-              </a:rPr>
-              <a:t> </a:t>
-            </a:r>
-            <a:r>
-              <a:rPr lang="en-US" altLang="zh-CN" b="0" dirty="0">
-                <a:latin typeface="Times New Roman" panose="02020603050405020304" pitchFamily="18" charset="0"/>
-                <a:cs typeface="Times New Roman" panose="02020603050405020304" pitchFamily="18" charset="0"/>
-              </a:rPr>
-              <a:t>–</a:t>
-            </a:r>
-            <a:r>
-              <a:rPr lang="zh-CN" altLang="en-US" b="0" dirty="0">
-                <a:latin typeface="Times New Roman" panose="02020603050405020304" pitchFamily="18" charset="0"/>
-                <a:cs typeface="Times New Roman" panose="02020603050405020304" pitchFamily="18" charset="0"/>
-              </a:rPr>
-              <a:t> </a:t>
-            </a:r>
-            <a:r>
-              <a:rPr lang="en-US" altLang="zh-CN" b="0" dirty="0">
-                <a:latin typeface="Times New Roman" panose="02020603050405020304" pitchFamily="18" charset="0"/>
-                <a:cs typeface="Times New Roman" panose="02020603050405020304" pitchFamily="18" charset="0"/>
-              </a:rPr>
-              <a:t>Function</a:t>
-            </a:r>
-            <a:r>
-              <a:rPr lang="zh-CN" altLang="en-US" b="0" dirty="0">
-                <a:latin typeface="Times New Roman" panose="02020603050405020304" pitchFamily="18" charset="0"/>
-                <a:cs typeface="Times New Roman" panose="02020603050405020304" pitchFamily="18" charset="0"/>
-              </a:rPr>
-              <a:t> </a:t>
-            </a:r>
-            <a:r>
-              <a:rPr lang="en-US" altLang="zh-CN" b="0" dirty="0">
-                <a:latin typeface="Times New Roman" panose="02020603050405020304" pitchFamily="18" charset="0"/>
-                <a:cs typeface="Times New Roman" panose="02020603050405020304" pitchFamily="18" charset="0"/>
-              </a:rPr>
-              <a:t>types</a:t>
-            </a:r>
-            <a:r>
-              <a:rPr lang="zh-CN" altLang="en-US" b="0" dirty="0">
-                <a:latin typeface="Times New Roman" panose="02020603050405020304" pitchFamily="18" charset="0"/>
-                <a:cs typeface="Times New Roman" panose="02020603050405020304" pitchFamily="18" charset="0"/>
-              </a:rPr>
-              <a:t> </a:t>
-            </a:r>
-            <a:r>
-              <a:rPr lang="en-US" altLang="zh-CN" b="0" dirty="0">
-                <a:latin typeface="Times New Roman" panose="02020603050405020304" pitchFamily="18" charset="0"/>
-                <a:cs typeface="Times New Roman" panose="02020603050405020304" pitchFamily="18" charset="0"/>
-              </a:rPr>
-              <a:t>supported</a:t>
-            </a:r>
-            <a:endParaRPr lang="en-US" b="0" dirty="0">
-              <a:latin typeface="Times New Roman" panose="02020603050405020304" pitchFamily="18" charset="0"/>
-              <a:cs typeface="Times New Roman" panose="02020603050405020304" pitchFamily="18" charset="0"/>
-            </a:endParaRPr>
+              <a:rPr lang="en-US" altLang="zh-CN" dirty="0"/>
+              <a:t>Implementation</a:t>
+            </a:r>
+            <a:r>
+              <a:rPr lang="zh-CN" altLang="en-US" dirty="0"/>
+              <a:t> </a:t>
+            </a:r>
+            <a:r>
+              <a:rPr lang="en-US" altLang="zh-CN" dirty="0"/>
+              <a:t>/</a:t>
+            </a:r>
+            <a:r>
+              <a:rPr lang="zh-CN" altLang="en-US" dirty="0"/>
+              <a:t> </a:t>
+            </a:r>
+            <a:r>
+              <a:rPr lang="en-US" altLang="zh-CN" dirty="0"/>
+              <a:t>Software</a:t>
+            </a:r>
+            <a:r>
+              <a:rPr lang="zh-CN" altLang="en-US" dirty="0"/>
+              <a:t> </a:t>
+            </a:r>
+            <a:r>
+              <a:rPr lang="en-US" altLang="zh-CN" dirty="0"/>
+              <a:t>organization</a:t>
+            </a:r>
+            <a:endParaRPr lang="en-US" dirty="0"/>
           </a:p>
         </p:txBody>
       </p:sp>
@@ -7078,7 +7269,7 @@
           <p:cNvPr id="3" name="Content Placeholder 2">
             <a:extLst>
               <a:ext uri="{FF2B5EF4-FFF2-40B4-BE49-F238E27FC236}">
-                <a16:creationId xmlns:a16="http://schemas.microsoft.com/office/drawing/2014/main" id="{9A1BD7D6-13F5-4541-A6CE-A4C0ABA63F42}"/>
+                <a16:creationId xmlns:a16="http://schemas.microsoft.com/office/drawing/2014/main" id="{6406A822-4C2C-2F4D-9D18-2502082A333C}"/>
               </a:ext>
             </a:extLst>
           </p:cNvPr>
@@ -7089,628 +7280,68 @@
             <p:ph idx="1"/>
           </p:nvPr>
         </p:nvSpPr>
+        <p:spPr/>
+        <p:txBody>
+          <a:bodyPr/>
+          <a:lstStyle/>
+          <a:p>
+            <a:endParaRPr lang="en-US"/>
+          </a:p>
+        </p:txBody>
+      </p:sp>
+      <p:sp>
+        <p:nvSpPr>
+          <p:cNvPr id="4" name="Rectangle 3">
+            <a:extLst>
+              <a:ext uri="{FF2B5EF4-FFF2-40B4-BE49-F238E27FC236}">
+                <a16:creationId xmlns:a16="http://schemas.microsoft.com/office/drawing/2014/main" id="{EF678307-0DD3-6949-B089-6A54A85CCCF4}"/>
+              </a:ext>
+            </a:extLst>
+          </p:cNvPr>
+          <p:cNvSpPr/>
+          <p:nvPr/>
+        </p:nvSpPr>
         <p:spPr>
           <a:xfrm>
-            <a:off x="1066800" y="1885606"/>
-            <a:ext cx="10058400" cy="4343744"/>
+            <a:off x="10195560" y="642594"/>
+            <a:ext cx="1428750" cy="568986"/>
           </a:xfrm>
+          <a:prstGeom prst="rect">
+            <a:avLst/>
+          </a:prstGeom>
         </p:spPr>
-        <p:txBody>
-          <a:bodyPr>
-            <a:normAutofit lnSpcReduction="10000"/>
-          </a:bodyPr>
+        <p:style>
+          <a:lnRef idx="2">
+            <a:schemeClr val="accent1">
+              <a:shade val="50000"/>
+            </a:schemeClr>
+          </a:lnRef>
+          <a:fillRef idx="1">
+            <a:schemeClr val="accent1"/>
+          </a:fillRef>
+          <a:effectRef idx="0">
+            <a:schemeClr val="accent1"/>
+          </a:effectRef>
+          <a:fontRef idx="minor">
+            <a:schemeClr val="lt1"/>
+          </a:fontRef>
+        </p:style>
+        <p:txBody>
+          <a:bodyPr rtlCol="0" anchor="ctr"/>
           <a:lstStyle/>
           <a:p>
-            <a:pPr>
-              <a:lnSpc>
-                <a:spcPct val="120000"/>
-              </a:lnSpc>
-              <a:buFont typeface="Courier New" panose="02070309020205020404" pitchFamily="49" charset="0"/>
-              <a:buChar char="o"/>
-            </a:pPr>
-            <a:r>
-              <a:rPr lang="en-US" sz="2400" dirty="0">
-                <a:latin typeface="Times New Roman" panose="02020603050405020304" pitchFamily="18" charset="0"/>
-                <a:cs typeface="Times New Roman" panose="02020603050405020304" pitchFamily="18" charset="0"/>
-              </a:rPr>
-              <a:t> </a:t>
-            </a:r>
-            <a:r>
-              <a:rPr lang="en-US" altLang="zh-CN" sz="2400" dirty="0">
-                <a:latin typeface="Times New Roman" panose="02020603050405020304" pitchFamily="18" charset="0"/>
-                <a:cs typeface="Times New Roman" panose="02020603050405020304" pitchFamily="18" charset="0"/>
-              </a:rPr>
-              <a:t>S</a:t>
-            </a:r>
-            <a:r>
-              <a:rPr lang="en-US" sz="2400" dirty="0">
-                <a:latin typeface="Times New Roman" panose="02020603050405020304" pitchFamily="18" charset="0"/>
-                <a:cs typeface="Times New Roman" panose="02020603050405020304" pitchFamily="18" charset="0"/>
-              </a:rPr>
-              <a:t>calar function of one variable</a:t>
-            </a:r>
-          </a:p>
-          <a:p>
-            <a:pPr lvl="2">
-              <a:lnSpc>
-                <a:spcPct val="120000"/>
-              </a:lnSpc>
-              <a:buFont typeface="Arial" panose="020B0604020202020204" pitchFamily="34" charset="0"/>
-              <a:buChar char="•"/>
-            </a:pPr>
-            <a:r>
-              <a:rPr lang="en-US" altLang="zh-CN" sz="2100" dirty="0">
-                <a:latin typeface="Times New Roman" panose="02020603050405020304" pitchFamily="18" charset="0"/>
-                <a:cs typeface="Times New Roman" panose="02020603050405020304" pitchFamily="18" charset="0"/>
-              </a:rPr>
-              <a:t>f</a:t>
-            </a:r>
-            <a:r>
-              <a:rPr lang="zh-CN" altLang="en-US" sz="2100" dirty="0">
-                <a:latin typeface="Times New Roman" panose="02020603050405020304" pitchFamily="18" charset="0"/>
-                <a:cs typeface="Times New Roman" panose="02020603050405020304" pitchFamily="18" charset="0"/>
-              </a:rPr>
-              <a:t> </a:t>
-            </a:r>
-            <a:r>
-              <a:rPr lang="en-US" altLang="zh-CN" sz="2100" dirty="0">
-                <a:latin typeface="Times New Roman" panose="02020603050405020304" pitchFamily="18" charset="0"/>
-                <a:cs typeface="Times New Roman" panose="02020603050405020304" pitchFamily="18" charset="0"/>
-              </a:rPr>
-              <a:t>=</a:t>
-            </a:r>
-            <a:r>
-              <a:rPr lang="zh-CN" altLang="en-US" sz="2100" dirty="0">
-                <a:latin typeface="Times New Roman" panose="02020603050405020304" pitchFamily="18" charset="0"/>
-                <a:cs typeface="Times New Roman" panose="02020603050405020304" pitchFamily="18" charset="0"/>
-              </a:rPr>
-              <a:t> </a:t>
-            </a:r>
-            <a:r>
-              <a:rPr lang="en-US" altLang="zh-CN" sz="2100" dirty="0">
-                <a:latin typeface="Times New Roman" panose="02020603050405020304" pitchFamily="18" charset="0"/>
-                <a:cs typeface="Times New Roman" panose="02020603050405020304" pitchFamily="18" charset="0"/>
-              </a:rPr>
-              <a:t>sin(2x)</a:t>
-            </a:r>
-            <a:endParaRPr lang="en-US" sz="2100" dirty="0">
-              <a:latin typeface="Times New Roman" panose="02020603050405020304" pitchFamily="18" charset="0"/>
-              <a:cs typeface="Times New Roman" panose="02020603050405020304" pitchFamily="18" charset="0"/>
-            </a:endParaRPr>
-          </a:p>
-          <a:p>
-            <a:pPr>
-              <a:lnSpc>
-                <a:spcPct val="120000"/>
-              </a:lnSpc>
-              <a:buFont typeface="Courier New" panose="02070309020205020404" pitchFamily="49" charset="0"/>
-              <a:buChar char="o"/>
-            </a:pPr>
-            <a:r>
-              <a:rPr lang="en-US" sz="2400" dirty="0">
-                <a:latin typeface="Times New Roman" panose="02020603050405020304" pitchFamily="18" charset="0"/>
-                <a:cs typeface="Times New Roman" panose="02020603050405020304" pitchFamily="18" charset="0"/>
-              </a:rPr>
-              <a:t> </a:t>
-            </a:r>
-            <a:r>
-              <a:rPr lang="en-US" altLang="zh-CN" sz="2400" dirty="0">
-                <a:latin typeface="Times New Roman" panose="02020603050405020304" pitchFamily="18" charset="0"/>
-                <a:cs typeface="Times New Roman" panose="02020603050405020304" pitchFamily="18" charset="0"/>
-              </a:rPr>
-              <a:t>S</a:t>
-            </a:r>
-            <a:r>
-              <a:rPr lang="en-US" sz="2400" dirty="0">
-                <a:latin typeface="Times New Roman" panose="02020603050405020304" pitchFamily="18" charset="0"/>
-                <a:cs typeface="Times New Roman" panose="02020603050405020304" pitchFamily="18" charset="0"/>
-              </a:rPr>
-              <a:t>calar function</a:t>
-            </a:r>
-            <a:r>
-              <a:rPr lang="zh-CN" altLang="en-US" sz="2400" dirty="0">
-                <a:latin typeface="Times New Roman" panose="02020603050405020304" pitchFamily="18" charset="0"/>
-                <a:cs typeface="Times New Roman" panose="02020603050405020304" pitchFamily="18" charset="0"/>
-              </a:rPr>
-              <a:t> </a:t>
-            </a:r>
-            <a:r>
-              <a:rPr lang="en-US" altLang="zh-CN" sz="2400" dirty="0">
-                <a:latin typeface="Times New Roman" panose="02020603050405020304" pitchFamily="18" charset="0"/>
-                <a:cs typeface="Times New Roman" panose="02020603050405020304" pitchFamily="18" charset="0"/>
-              </a:rPr>
-              <a:t>of</a:t>
-            </a:r>
-            <a:r>
-              <a:rPr lang="zh-CN" altLang="en-US" sz="2400" dirty="0">
-                <a:latin typeface="Times New Roman" panose="02020603050405020304" pitchFamily="18" charset="0"/>
-                <a:cs typeface="Times New Roman" panose="02020603050405020304" pitchFamily="18" charset="0"/>
-              </a:rPr>
-              <a:t> </a:t>
-            </a:r>
-            <a:r>
-              <a:rPr lang="en-US" altLang="zh-CN" sz="2400" dirty="0">
-                <a:latin typeface="Times New Roman" panose="02020603050405020304" pitchFamily="18" charset="0"/>
-                <a:cs typeface="Times New Roman" panose="02020603050405020304" pitchFamily="18" charset="0"/>
-              </a:rPr>
-              <a:t>multiple</a:t>
-            </a:r>
-            <a:r>
-              <a:rPr lang="zh-CN" altLang="en-US" sz="2400" dirty="0">
-                <a:latin typeface="Times New Roman" panose="02020603050405020304" pitchFamily="18" charset="0"/>
-                <a:cs typeface="Times New Roman" panose="02020603050405020304" pitchFamily="18" charset="0"/>
-              </a:rPr>
-              <a:t> </a:t>
-            </a:r>
-            <a:r>
-              <a:rPr lang="en-US" altLang="zh-CN" sz="2400" dirty="0">
-                <a:latin typeface="Times New Roman" panose="02020603050405020304" pitchFamily="18" charset="0"/>
-                <a:cs typeface="Times New Roman" panose="02020603050405020304" pitchFamily="18" charset="0"/>
-              </a:rPr>
-              <a:t>variables</a:t>
-            </a:r>
-          </a:p>
-          <a:p>
-            <a:pPr lvl="2">
-              <a:lnSpc>
-                <a:spcPct val="120000"/>
-              </a:lnSpc>
-              <a:buFont typeface="Arial" panose="020B0604020202020204" pitchFamily="34" charset="0"/>
-              <a:buChar char="•"/>
-            </a:pPr>
-            <a:r>
-              <a:rPr lang="en-US" altLang="zh-CN" sz="2100" dirty="0">
-                <a:latin typeface="Times New Roman" panose="02020603050405020304" pitchFamily="18" charset="0"/>
-                <a:cs typeface="Times New Roman" panose="02020603050405020304" pitchFamily="18" charset="0"/>
-              </a:rPr>
-              <a:t>f</a:t>
-            </a:r>
-            <a:r>
-              <a:rPr lang="zh-CN" altLang="en-US" sz="2100" dirty="0">
-                <a:latin typeface="Times New Roman" panose="02020603050405020304" pitchFamily="18" charset="0"/>
-                <a:cs typeface="Times New Roman" panose="02020603050405020304" pitchFamily="18" charset="0"/>
-              </a:rPr>
-              <a:t> </a:t>
-            </a:r>
-            <a:r>
-              <a:rPr lang="en-US" altLang="zh-CN" sz="2100" dirty="0">
-                <a:latin typeface="Times New Roman" panose="02020603050405020304" pitchFamily="18" charset="0"/>
-                <a:cs typeface="Times New Roman" panose="02020603050405020304" pitchFamily="18" charset="0"/>
-              </a:rPr>
-              <a:t>=</a:t>
-            </a:r>
-            <a:r>
-              <a:rPr lang="zh-CN" altLang="en-US" sz="2100" dirty="0">
-                <a:latin typeface="Times New Roman" panose="02020603050405020304" pitchFamily="18" charset="0"/>
-                <a:cs typeface="Times New Roman" panose="02020603050405020304" pitchFamily="18" charset="0"/>
-              </a:rPr>
-              <a:t> </a:t>
-            </a:r>
-            <a:r>
-              <a:rPr lang="en-US" altLang="zh-CN" sz="2100" dirty="0">
-                <a:latin typeface="Times New Roman" panose="02020603050405020304" pitchFamily="18" charset="0"/>
-                <a:cs typeface="Times New Roman" panose="02020603050405020304" pitchFamily="18" charset="0"/>
-              </a:rPr>
-              <a:t>sin(xy)</a:t>
-            </a:r>
-          </a:p>
-          <a:p>
-            <a:pPr>
-              <a:lnSpc>
-                <a:spcPct val="120000"/>
-              </a:lnSpc>
-              <a:buFont typeface="Courier New" panose="02070309020205020404" pitchFamily="49" charset="0"/>
-              <a:buChar char="o"/>
-            </a:pPr>
-            <a:r>
-              <a:rPr lang="zh-CN" altLang="en-US" sz="2400" dirty="0">
-                <a:latin typeface="Times New Roman" panose="02020603050405020304" pitchFamily="18" charset="0"/>
-                <a:cs typeface="Times New Roman" panose="02020603050405020304" pitchFamily="18" charset="0"/>
-              </a:rPr>
-              <a:t> </a:t>
-            </a:r>
-            <a:r>
-              <a:rPr lang="en-US" altLang="zh-CN" sz="2400" dirty="0">
-                <a:latin typeface="Times New Roman" panose="02020603050405020304" pitchFamily="18" charset="0"/>
-                <a:cs typeface="Times New Roman" panose="02020603050405020304" pitchFamily="18" charset="0"/>
-              </a:rPr>
-              <a:t>V</a:t>
-            </a:r>
-            <a:r>
-              <a:rPr lang="en-US" sz="2400" dirty="0">
-                <a:latin typeface="Times New Roman" panose="02020603050405020304" pitchFamily="18" charset="0"/>
-                <a:cs typeface="Times New Roman" panose="02020603050405020304" pitchFamily="18" charset="0"/>
-              </a:rPr>
-              <a:t>ector-valued function</a:t>
-            </a:r>
-            <a:r>
-              <a:rPr lang="zh-CN" altLang="en-US" sz="2400" dirty="0">
-                <a:latin typeface="Times New Roman" panose="02020603050405020304" pitchFamily="18" charset="0"/>
-                <a:cs typeface="Times New Roman" panose="02020603050405020304" pitchFamily="18" charset="0"/>
-              </a:rPr>
-              <a:t> </a:t>
-            </a:r>
-            <a:r>
-              <a:rPr lang="en-US" altLang="zh-CN" sz="2400" dirty="0">
-                <a:latin typeface="Times New Roman" panose="02020603050405020304" pitchFamily="18" charset="0"/>
-                <a:cs typeface="Times New Roman" panose="02020603050405020304" pitchFamily="18" charset="0"/>
-              </a:rPr>
-              <a:t>of</a:t>
-            </a:r>
-            <a:r>
-              <a:rPr lang="zh-CN" altLang="en-US" sz="2400" dirty="0">
-                <a:latin typeface="Times New Roman" panose="02020603050405020304" pitchFamily="18" charset="0"/>
-                <a:cs typeface="Times New Roman" panose="02020603050405020304" pitchFamily="18" charset="0"/>
-              </a:rPr>
-              <a:t> </a:t>
-            </a:r>
-            <a:r>
-              <a:rPr lang="en-US" altLang="zh-CN" sz="2400" dirty="0">
-                <a:latin typeface="Times New Roman" panose="02020603050405020304" pitchFamily="18" charset="0"/>
-                <a:cs typeface="Times New Roman" panose="02020603050405020304" pitchFamily="18" charset="0"/>
-              </a:rPr>
-              <a:t>multiple</a:t>
-            </a:r>
-            <a:r>
-              <a:rPr lang="zh-CN" altLang="en-US" sz="2400" dirty="0">
-                <a:latin typeface="Times New Roman" panose="02020603050405020304" pitchFamily="18" charset="0"/>
-                <a:cs typeface="Times New Roman" panose="02020603050405020304" pitchFamily="18" charset="0"/>
-              </a:rPr>
-              <a:t> </a:t>
-            </a:r>
-            <a:r>
-              <a:rPr lang="en-US" altLang="zh-CN" sz="2400" dirty="0">
-                <a:latin typeface="Times New Roman" panose="02020603050405020304" pitchFamily="18" charset="0"/>
-                <a:cs typeface="Times New Roman" panose="02020603050405020304" pitchFamily="18" charset="0"/>
-              </a:rPr>
-              <a:t>variables</a:t>
-            </a:r>
-          </a:p>
-          <a:p>
-            <a:pPr lvl="2">
-              <a:lnSpc>
-                <a:spcPct val="120000"/>
-              </a:lnSpc>
-              <a:buFont typeface="Arial" panose="020B0604020202020204" pitchFamily="34" charset="0"/>
-              <a:buChar char="•"/>
-            </a:pPr>
-            <a:r>
-              <a:rPr lang="en-US" altLang="zh-CN" sz="2100" dirty="0">
-                <a:latin typeface="Times New Roman" panose="02020603050405020304" pitchFamily="18" charset="0"/>
-                <a:cs typeface="Times New Roman" panose="02020603050405020304" pitchFamily="18" charset="0"/>
-              </a:rPr>
-              <a:t>f</a:t>
-            </a:r>
-            <a:r>
-              <a:rPr lang="zh-CN" altLang="en-US" sz="2100" dirty="0">
-                <a:latin typeface="Times New Roman" panose="02020603050405020304" pitchFamily="18" charset="0"/>
-                <a:cs typeface="Times New Roman" panose="02020603050405020304" pitchFamily="18" charset="0"/>
-              </a:rPr>
-              <a:t> </a:t>
-            </a:r>
-            <a:r>
-              <a:rPr lang="en-US" altLang="zh-CN" sz="2100" dirty="0">
-                <a:latin typeface="Times New Roman" panose="02020603050405020304" pitchFamily="18" charset="0"/>
-                <a:cs typeface="Times New Roman" panose="02020603050405020304" pitchFamily="18" charset="0"/>
-              </a:rPr>
-              <a:t>=</a:t>
-            </a:r>
-            <a:r>
-              <a:rPr lang="zh-CN" altLang="en-US" sz="2100" dirty="0">
-                <a:latin typeface="Times New Roman" panose="02020603050405020304" pitchFamily="18" charset="0"/>
-                <a:cs typeface="Times New Roman" panose="02020603050405020304" pitchFamily="18" charset="0"/>
-              </a:rPr>
-              <a:t> </a:t>
-            </a:r>
-            <a:r>
-              <a:rPr lang="en-US" altLang="zh-CN" sz="2100" dirty="0">
-                <a:latin typeface="Times New Roman" panose="02020603050405020304" pitchFamily="18" charset="0"/>
-                <a:cs typeface="Times New Roman" panose="02020603050405020304" pitchFamily="18" charset="0"/>
-              </a:rPr>
-              <a:t>[sin(2x),</a:t>
-            </a:r>
-            <a:r>
-              <a:rPr lang="zh-CN" altLang="en-US" sz="2100" dirty="0">
-                <a:latin typeface="Times New Roman" panose="02020603050405020304" pitchFamily="18" charset="0"/>
-                <a:cs typeface="Times New Roman" panose="02020603050405020304" pitchFamily="18" charset="0"/>
-              </a:rPr>
-              <a:t> </a:t>
-            </a:r>
-            <a:r>
-              <a:rPr lang="en-US" altLang="zh-CN" sz="2100" dirty="0">
-                <a:latin typeface="Times New Roman" panose="02020603050405020304" pitchFamily="18" charset="0"/>
-                <a:cs typeface="Times New Roman" panose="02020603050405020304" pitchFamily="18" charset="0"/>
-              </a:rPr>
-              <a:t>sin(xy)]</a:t>
-            </a:r>
-            <a:endParaRPr lang="en-US" b="1" dirty="0"/>
-          </a:p>
-          <a:p>
-            <a:pPr>
-              <a:lnSpc>
-                <a:spcPct val="120000"/>
-              </a:lnSpc>
-              <a:buFont typeface="Courier New" panose="02070309020205020404" pitchFamily="49" charset="0"/>
-              <a:buChar char="o"/>
-            </a:pPr>
-            <a:r>
-              <a:rPr lang="zh-CN" altLang="en-US" sz="2400" dirty="0">
-                <a:latin typeface="Times New Roman" panose="02020603050405020304" pitchFamily="18" charset="0"/>
-                <a:cs typeface="Times New Roman" panose="02020603050405020304" pitchFamily="18" charset="0"/>
-              </a:rPr>
-              <a:t> </a:t>
-            </a:r>
-            <a:r>
-              <a:rPr lang="en-US" altLang="zh-CN" sz="2400" dirty="0">
-                <a:latin typeface="Times New Roman" panose="02020603050405020304" pitchFamily="18" charset="0"/>
-                <a:cs typeface="Times New Roman" panose="02020603050405020304" pitchFamily="18" charset="0"/>
-              </a:rPr>
-              <a:t>Calculate</a:t>
-            </a:r>
-            <a:r>
-              <a:rPr lang="zh-CN" altLang="en-US" sz="2400" dirty="0">
-                <a:latin typeface="Times New Roman" panose="02020603050405020304" pitchFamily="18" charset="0"/>
-                <a:cs typeface="Times New Roman" panose="02020603050405020304" pitchFamily="18" charset="0"/>
-              </a:rPr>
-              <a:t> </a:t>
-            </a:r>
-            <a:r>
-              <a:rPr lang="en-US" altLang="zh-CN" sz="2400" dirty="0">
-                <a:latin typeface="Times New Roman" panose="02020603050405020304" pitchFamily="18" charset="0"/>
-                <a:cs typeface="Times New Roman" panose="02020603050405020304" pitchFamily="18" charset="0"/>
-              </a:rPr>
-              <a:t>the</a:t>
-            </a:r>
-            <a:r>
-              <a:rPr lang="zh-CN" altLang="en-US" sz="2400" dirty="0">
-                <a:latin typeface="Times New Roman" panose="02020603050405020304" pitchFamily="18" charset="0"/>
-                <a:cs typeface="Times New Roman" panose="02020603050405020304" pitchFamily="18" charset="0"/>
-              </a:rPr>
-              <a:t> </a:t>
-            </a:r>
-            <a:r>
-              <a:rPr lang="en-US" altLang="zh-CN" sz="2400" dirty="0">
-                <a:latin typeface="Times New Roman" panose="02020603050405020304" pitchFamily="18" charset="0"/>
-                <a:cs typeface="Times New Roman" panose="02020603050405020304" pitchFamily="18" charset="0"/>
-              </a:rPr>
-              <a:t>derivatives</a:t>
-            </a:r>
-            <a:r>
-              <a:rPr lang="zh-CN" altLang="en-US" sz="2400" dirty="0">
-                <a:latin typeface="Times New Roman" panose="02020603050405020304" pitchFamily="18" charset="0"/>
-                <a:cs typeface="Times New Roman" panose="02020603050405020304" pitchFamily="18" charset="0"/>
-              </a:rPr>
-              <a:t> </a:t>
-            </a:r>
-            <a:r>
-              <a:rPr lang="en-US" altLang="zh-CN" sz="2400" dirty="0">
-                <a:latin typeface="Times New Roman" panose="02020603050405020304" pitchFamily="18" charset="0"/>
-                <a:cs typeface="Times New Roman" panose="02020603050405020304" pitchFamily="18" charset="0"/>
-              </a:rPr>
-              <a:t>for</a:t>
-            </a:r>
-            <a:r>
-              <a:rPr lang="zh-CN" altLang="en-US" sz="2400" dirty="0">
-                <a:latin typeface="Times New Roman" panose="02020603050405020304" pitchFamily="18" charset="0"/>
-                <a:cs typeface="Times New Roman" panose="02020603050405020304" pitchFamily="18" charset="0"/>
-              </a:rPr>
-              <a:t> </a:t>
-            </a:r>
-            <a:r>
-              <a:rPr lang="en-US" altLang="zh-CN" sz="2400" dirty="0">
-                <a:latin typeface="Times New Roman" panose="02020603050405020304" pitchFamily="18" charset="0"/>
-                <a:cs typeface="Times New Roman" panose="02020603050405020304" pitchFamily="18" charset="0"/>
-              </a:rPr>
-              <a:t>a</a:t>
-            </a:r>
-            <a:r>
-              <a:rPr lang="en-US" sz="2400" dirty="0">
-                <a:latin typeface="Times New Roman" panose="02020603050405020304" pitchFamily="18" charset="0"/>
-                <a:cs typeface="Times New Roman" panose="02020603050405020304" pitchFamily="18" charset="0"/>
-              </a:rPr>
-              <a:t>ny </a:t>
-            </a:r>
-            <a:r>
-              <a:rPr lang="en-US" altLang="zh-CN" sz="2400" dirty="0">
-                <a:latin typeface="Times New Roman" panose="02020603050405020304" pitchFamily="18" charset="0"/>
-                <a:cs typeface="Times New Roman" panose="02020603050405020304" pitchFamily="18" charset="0"/>
-              </a:rPr>
-              <a:t>of</a:t>
-            </a:r>
-            <a:r>
-              <a:rPr lang="zh-CN" altLang="en-US" sz="2400" dirty="0">
-                <a:latin typeface="Times New Roman" panose="02020603050405020304" pitchFamily="18" charset="0"/>
-                <a:cs typeface="Times New Roman" panose="02020603050405020304" pitchFamily="18" charset="0"/>
-              </a:rPr>
-              <a:t> </a:t>
-            </a:r>
-            <a:r>
-              <a:rPr lang="en-US" altLang="zh-CN" sz="2400" dirty="0">
-                <a:latin typeface="Times New Roman" panose="02020603050405020304" pitchFamily="18" charset="0"/>
-                <a:cs typeface="Times New Roman" panose="02020603050405020304" pitchFamily="18" charset="0"/>
-              </a:rPr>
-              <a:t>the</a:t>
-            </a:r>
-            <a:r>
-              <a:rPr lang="zh-CN" altLang="en-US" sz="2400" dirty="0">
-                <a:latin typeface="Times New Roman" panose="02020603050405020304" pitchFamily="18" charset="0"/>
-                <a:cs typeface="Times New Roman" panose="02020603050405020304" pitchFamily="18" charset="0"/>
-              </a:rPr>
-              <a:t> </a:t>
-            </a:r>
-            <a:r>
-              <a:rPr lang="en-US" altLang="zh-CN" sz="2400" dirty="0">
-                <a:latin typeface="Times New Roman" panose="02020603050405020304" pitchFamily="18" charset="0"/>
-                <a:cs typeface="Times New Roman" panose="02020603050405020304" pitchFamily="18" charset="0"/>
-              </a:rPr>
-              <a:t>previous</a:t>
-            </a:r>
-            <a:r>
-              <a:rPr lang="zh-CN" altLang="en-US" sz="2400" dirty="0">
-                <a:latin typeface="Times New Roman" panose="02020603050405020304" pitchFamily="18" charset="0"/>
-                <a:cs typeface="Times New Roman" panose="02020603050405020304" pitchFamily="18" charset="0"/>
-              </a:rPr>
-              <a:t> </a:t>
-            </a:r>
-            <a:r>
-              <a:rPr lang="en-US" sz="2400" dirty="0">
-                <a:latin typeface="Times New Roman" panose="02020603050405020304" pitchFamily="18" charset="0"/>
-                <a:cs typeface="Times New Roman" panose="02020603050405020304" pitchFamily="18" charset="0"/>
-              </a:rPr>
-              <a:t>type of function</a:t>
-            </a:r>
-            <a:r>
-              <a:rPr lang="zh-CN" altLang="en-US" sz="2400" dirty="0">
-                <a:latin typeface="Times New Roman" panose="02020603050405020304" pitchFamily="18" charset="0"/>
-                <a:cs typeface="Times New Roman" panose="02020603050405020304" pitchFamily="18" charset="0"/>
-              </a:rPr>
-              <a:t> </a:t>
-            </a:r>
-            <a:r>
-              <a:rPr lang="en-US" sz="2400" dirty="0">
-                <a:latin typeface="Times New Roman" panose="02020603050405020304" pitchFamily="18" charset="0"/>
-                <a:cs typeface="Times New Roman" panose="02020603050405020304" pitchFamily="18" charset="0"/>
-              </a:rPr>
-              <a:t>on a grid of points</a:t>
-            </a:r>
-          </a:p>
-          <a:p>
-            <a:pPr lvl="2">
-              <a:lnSpc>
-                <a:spcPct val="120000"/>
-              </a:lnSpc>
-              <a:buFont typeface="Arial" panose="020B0604020202020204" pitchFamily="34" charset="0"/>
-              <a:buChar char="•"/>
-            </a:pPr>
-            <a:r>
-              <a:rPr lang="en-US" altLang="zh-CN" sz="2100" dirty="0">
-                <a:latin typeface="Times New Roman" panose="02020603050405020304" pitchFamily="18" charset="0"/>
-                <a:cs typeface="Times New Roman" panose="02020603050405020304" pitchFamily="18" charset="0"/>
-              </a:rPr>
-              <a:t>f</a:t>
-            </a:r>
-            <a:r>
-              <a:rPr lang="zh-CN" altLang="en-US" sz="2100" dirty="0">
-                <a:latin typeface="Times New Roman" panose="02020603050405020304" pitchFamily="18" charset="0"/>
-                <a:cs typeface="Times New Roman" panose="02020603050405020304" pitchFamily="18" charset="0"/>
-              </a:rPr>
-              <a:t> </a:t>
-            </a:r>
-            <a:r>
-              <a:rPr lang="en-US" altLang="zh-CN" sz="2100" dirty="0">
-                <a:latin typeface="Times New Roman" panose="02020603050405020304" pitchFamily="18" charset="0"/>
-                <a:cs typeface="Times New Roman" panose="02020603050405020304" pitchFamily="18" charset="0"/>
-              </a:rPr>
-              <a:t>=</a:t>
-            </a:r>
-            <a:r>
-              <a:rPr lang="zh-CN" altLang="en-US" sz="2100" dirty="0">
-                <a:latin typeface="Times New Roman" panose="02020603050405020304" pitchFamily="18" charset="0"/>
-                <a:cs typeface="Times New Roman" panose="02020603050405020304" pitchFamily="18" charset="0"/>
-              </a:rPr>
-              <a:t> </a:t>
-            </a:r>
-            <a:r>
-              <a:rPr lang="en-US" altLang="zh-CN" sz="2100" dirty="0">
-                <a:latin typeface="Times New Roman" panose="02020603050405020304" pitchFamily="18" charset="0"/>
-                <a:cs typeface="Times New Roman" panose="02020603050405020304" pitchFamily="18" charset="0"/>
-              </a:rPr>
-              <a:t>sin(xy),</a:t>
-            </a:r>
-            <a:r>
-              <a:rPr lang="zh-CN" altLang="en-US" sz="2100" dirty="0">
-                <a:latin typeface="Times New Roman" panose="02020603050405020304" pitchFamily="18" charset="0"/>
-                <a:cs typeface="Times New Roman" panose="02020603050405020304" pitchFamily="18" charset="0"/>
-              </a:rPr>
-              <a:t> </a:t>
-            </a:r>
-            <a:r>
-              <a:rPr lang="en-US" altLang="zh-CN" sz="2100" dirty="0">
-                <a:latin typeface="Times New Roman" panose="02020603050405020304" pitchFamily="18" charset="0"/>
-                <a:cs typeface="Times New Roman" panose="02020603050405020304" pitchFamily="18" charset="0"/>
-              </a:rPr>
-              <a:t>x</a:t>
-            </a:r>
-            <a:r>
-              <a:rPr lang="zh-CN" altLang="en-US" sz="2100" dirty="0">
-                <a:latin typeface="Times New Roman" panose="02020603050405020304" pitchFamily="18" charset="0"/>
-                <a:cs typeface="Times New Roman" panose="02020603050405020304" pitchFamily="18" charset="0"/>
-              </a:rPr>
-              <a:t> </a:t>
-            </a:r>
-            <a:r>
-              <a:rPr lang="en-US" altLang="zh-CN" sz="2100" dirty="0">
-                <a:latin typeface="Times New Roman" panose="02020603050405020304" pitchFamily="18" charset="0"/>
-                <a:cs typeface="Times New Roman" panose="02020603050405020304" pitchFamily="18" charset="0"/>
-              </a:rPr>
-              <a:t>=</a:t>
-            </a:r>
-            <a:r>
-              <a:rPr lang="zh-CN" altLang="en-US" sz="2100" dirty="0">
-                <a:latin typeface="Times New Roman" panose="02020603050405020304" pitchFamily="18" charset="0"/>
-                <a:cs typeface="Times New Roman" panose="02020603050405020304" pitchFamily="18" charset="0"/>
-              </a:rPr>
-              <a:t> </a:t>
-            </a:r>
-            <a:r>
-              <a:rPr lang="en-US" altLang="zh-CN" sz="2100" dirty="0">
-                <a:latin typeface="Times New Roman" panose="02020603050405020304" pitchFamily="18" charset="0"/>
-                <a:cs typeface="Times New Roman" panose="02020603050405020304" pitchFamily="18" charset="0"/>
-              </a:rPr>
-              <a:t>[1,2],</a:t>
-            </a:r>
-            <a:r>
-              <a:rPr lang="zh-CN" altLang="en-US" sz="2100" dirty="0">
-                <a:latin typeface="Times New Roman" panose="02020603050405020304" pitchFamily="18" charset="0"/>
-                <a:cs typeface="Times New Roman" panose="02020603050405020304" pitchFamily="18" charset="0"/>
-              </a:rPr>
-              <a:t>  </a:t>
-            </a:r>
-            <a:r>
-              <a:rPr lang="en-US" altLang="zh-CN" sz="2100" dirty="0">
-                <a:latin typeface="Times New Roman" panose="02020603050405020304" pitchFamily="18" charset="0"/>
-                <a:cs typeface="Times New Roman" panose="02020603050405020304" pitchFamily="18" charset="0"/>
-              </a:rPr>
-              <a:t>y</a:t>
-            </a:r>
-            <a:r>
-              <a:rPr lang="zh-CN" altLang="en-US" sz="2100" dirty="0">
-                <a:latin typeface="Times New Roman" panose="02020603050405020304" pitchFamily="18" charset="0"/>
-                <a:cs typeface="Times New Roman" panose="02020603050405020304" pitchFamily="18" charset="0"/>
-              </a:rPr>
-              <a:t> </a:t>
-            </a:r>
-            <a:r>
-              <a:rPr lang="en-US" altLang="zh-CN" sz="2100" dirty="0">
-                <a:latin typeface="Times New Roman" panose="02020603050405020304" pitchFamily="18" charset="0"/>
-                <a:cs typeface="Times New Roman" panose="02020603050405020304" pitchFamily="18" charset="0"/>
-              </a:rPr>
-              <a:t>=</a:t>
-            </a:r>
-            <a:r>
-              <a:rPr lang="zh-CN" altLang="en-US" sz="2100" dirty="0">
-                <a:latin typeface="Times New Roman" panose="02020603050405020304" pitchFamily="18" charset="0"/>
-                <a:cs typeface="Times New Roman" panose="02020603050405020304" pitchFamily="18" charset="0"/>
-              </a:rPr>
-              <a:t> </a:t>
-            </a:r>
-            <a:r>
-              <a:rPr lang="en-US" altLang="zh-CN" sz="2100" dirty="0">
-                <a:latin typeface="Times New Roman" panose="02020603050405020304" pitchFamily="18" charset="0"/>
-                <a:cs typeface="Times New Roman" panose="02020603050405020304" pitchFamily="18" charset="0"/>
-              </a:rPr>
-              <a:t>3</a:t>
-            </a:r>
-          </a:p>
-          <a:p>
-            <a:endParaRPr lang="en-US" dirty="0"/>
+            <a:pPr algn="ctr"/>
+            <a:r>
+              <a:rPr lang="en-US" altLang="zh-CN" dirty="0"/>
+              <a:t>R</a:t>
+            </a:r>
           </a:p>
         </p:txBody>
       </p:sp>
     </p:spTree>
     <p:extLst>
       <p:ext uri="{BB962C8B-B14F-4D97-AF65-F5344CB8AC3E}">
-        <p14:creationId xmlns:p14="http://schemas.microsoft.com/office/powerpoint/2010/main" val="529316642"/>
+        <p14:creationId xmlns:p14="http://schemas.microsoft.com/office/powerpoint/2010/main" val="3173995556"/>
       </p:ext>
     </p:extLst>
   </p:cSld>
@@ -7819,7 +7450,21 @@
                 <a:latin typeface="Times New Roman" panose="02020603050405020304" pitchFamily="18" charset="0"/>
                 <a:cs typeface="Times New Roman" panose="02020603050405020304" pitchFamily="18" charset="0"/>
               </a:rPr>
-              <a:t>Functions</a:t>
+              <a:t>Function</a:t>
+            </a:r>
+            <a:r>
+              <a:rPr lang="zh-CN" altLang="en-US" b="0" dirty="0">
+                <a:latin typeface="Times New Roman" panose="02020603050405020304" pitchFamily="18" charset="0"/>
+                <a:cs typeface="Times New Roman" panose="02020603050405020304" pitchFamily="18" charset="0"/>
+              </a:rPr>
+              <a:t> </a:t>
+            </a:r>
+            <a:r>
+              <a:rPr lang="en-US" altLang="zh-CN" b="0" dirty="0">
+                <a:latin typeface="Times New Roman" panose="02020603050405020304" pitchFamily="18" charset="0"/>
+                <a:cs typeface="Times New Roman" panose="02020603050405020304" pitchFamily="18" charset="0"/>
+              </a:rPr>
+              <a:t>types</a:t>
             </a:r>
             <a:r>
               <a:rPr lang="zh-CN" altLang="en-US" b="0" dirty="0">
@@ -7860,441 +7505,675 @@
         </p:nvSpPr>
         <p:spPr>
           <a:xfrm>
-            <a:off x="1066800" y="2014194"/>
+            <a:off x="1066800" y="1885606"/>
             <a:ext cx="10058400" cy="4343744"/>
           </a:xfrm>
         </p:spPr>
         <p:txBody>
           <a:bodyPr>
-            <a:normAutofit/>
+            <a:normAutofit lnSpcReduction="10000"/>
           </a:bodyPr>
           <a:lstStyle/>
           <a:p>
-            <a:r>
-              <a:rPr lang="en-US" sz="2000" dirty="0">
-                <a:latin typeface="Times New Roman" panose="02020603050405020304" pitchFamily="18" charset="0"/>
-                <a:cs typeface="Times New Roman" panose="02020603050405020304" pitchFamily="18" charset="0"/>
-              </a:rPr>
-              <a:t>Basic Operations</a:t>
-            </a:r>
-            <a:r>
-              <a:rPr lang="zh-CN" altLang="en-US" sz="2000" dirty="0">
-                <a:latin typeface="Times New Roman" panose="02020603050405020304" pitchFamily="18" charset="0"/>
-                <a:cs typeface="Times New Roman" panose="02020603050405020304" pitchFamily="18" charset="0"/>
-              </a:rPr>
-              <a:t> </a:t>
-            </a:r>
-            <a:r>
-              <a:rPr lang="en-US" altLang="zh-CN" sz="2000" dirty="0">
-                <a:latin typeface="Times New Roman" panose="02020603050405020304" pitchFamily="18" charset="0"/>
-                <a:cs typeface="Times New Roman" panose="02020603050405020304" pitchFamily="18" charset="0"/>
-              </a:rPr>
-              <a:t>(+,</a:t>
-            </a:r>
-            <a:r>
-              <a:rPr lang="zh-CN" altLang="en-US" sz="2000" dirty="0">
-                <a:latin typeface="Times New Roman" panose="02020603050405020304" pitchFamily="18" charset="0"/>
-                <a:cs typeface="Times New Roman" panose="02020603050405020304" pitchFamily="18" charset="0"/>
-              </a:rPr>
-              <a:t> </a:t>
-            </a:r>
-            <a:r>
-              <a:rPr lang="en-US" altLang="zh-CN" sz="2000" dirty="0">
-                <a:latin typeface="Times New Roman" panose="02020603050405020304" pitchFamily="18" charset="0"/>
-                <a:cs typeface="Times New Roman" panose="02020603050405020304" pitchFamily="18" charset="0"/>
-              </a:rPr>
-              <a:t>-</a:t>
-            </a:r>
-            <a:r>
-              <a:rPr lang="zh-CN" altLang="en-US" sz="2000" dirty="0">
-                <a:latin typeface="Times New Roman" panose="02020603050405020304" pitchFamily="18" charset="0"/>
-                <a:cs typeface="Times New Roman" panose="02020603050405020304" pitchFamily="18" charset="0"/>
-              </a:rPr>
-              <a:t> </a:t>
-            </a:r>
-            <a:r>
-              <a:rPr lang="en-US" altLang="zh-CN" sz="2000" dirty="0">
-                <a:latin typeface="Times New Roman" panose="02020603050405020304" pitchFamily="18" charset="0"/>
-                <a:cs typeface="Times New Roman" panose="02020603050405020304" pitchFamily="18" charset="0"/>
-              </a:rPr>
-              <a:t>,</a:t>
-            </a:r>
-            <a:r>
-              <a:rPr lang="zh-CN" altLang="en-US" sz="2000" dirty="0">
-                <a:latin typeface="Times New Roman" panose="02020603050405020304" pitchFamily="18" charset="0"/>
-                <a:cs typeface="Times New Roman" panose="02020603050405020304" pitchFamily="18" charset="0"/>
-              </a:rPr>
-              <a:t> *</a:t>
-            </a:r>
-            <a:r>
-              <a:rPr lang="en-US" altLang="zh-CN" sz="2000" dirty="0">
-                <a:latin typeface="Times New Roman" panose="02020603050405020304" pitchFamily="18" charset="0"/>
-                <a:cs typeface="Times New Roman" panose="02020603050405020304" pitchFamily="18" charset="0"/>
-              </a:rPr>
-              <a:t>,</a:t>
-            </a:r>
-            <a:r>
-              <a:rPr lang="zh-CN" altLang="en-US" sz="2000" dirty="0">
-                <a:latin typeface="Times New Roman" panose="02020603050405020304" pitchFamily="18" charset="0"/>
-                <a:cs typeface="Times New Roman" panose="02020603050405020304" pitchFamily="18" charset="0"/>
-              </a:rPr>
-              <a:t> </a:t>
-            </a:r>
-            <a:r>
-              <a:rPr lang="en-US" altLang="zh-CN" sz="2000" dirty="0">
-                <a:latin typeface="Times New Roman" panose="02020603050405020304" pitchFamily="18" charset="0"/>
-                <a:cs typeface="Times New Roman" panose="02020603050405020304" pitchFamily="18" charset="0"/>
-              </a:rPr>
-              <a:t>/,</a:t>
-            </a:r>
-            <a:r>
-              <a:rPr lang="zh-CN" altLang="en-US" sz="2000" dirty="0">
-                <a:latin typeface="Times New Roman" panose="02020603050405020304" pitchFamily="18" charset="0"/>
-                <a:cs typeface="Times New Roman" panose="02020603050405020304" pitchFamily="18" charset="0"/>
-              </a:rPr>
-              <a:t> **</a:t>
-            </a:r>
-            <a:r>
-              <a:rPr lang="en-US" altLang="zh-CN" sz="2000" dirty="0">
-                <a:latin typeface="Times New Roman" panose="02020603050405020304" pitchFamily="18" charset="0"/>
-                <a:cs typeface="Times New Roman" panose="02020603050405020304" pitchFamily="18" charset="0"/>
-              </a:rPr>
-              <a:t>)</a:t>
-            </a:r>
-            <a:endParaRPr lang="en-US" sz="2000" dirty="0">
+            <a:pPr>
+              <a:lnSpc>
+                <a:spcPct val="120000"/>
+              </a:lnSpc>
+              <a:buFont typeface="Courier New" panose="02070309020205020404" pitchFamily="49" charset="0"/>
+              <a:buChar char="o"/>
+            </a:pPr>
+            <a:r>
+              <a:rPr lang="en-US" sz="2400" dirty="0">
+                <a:latin typeface="Times New Roman" panose="02020603050405020304" pitchFamily="18" charset="0"/>
+                <a:cs typeface="Times New Roman" panose="02020603050405020304" pitchFamily="18" charset="0"/>
+              </a:rPr>
+              <a:t> </a:t>
+            </a:r>
+            <a:r>
+              <a:rPr lang="en-US" altLang="zh-CN" sz="2400" dirty="0">
+                <a:latin typeface="Times New Roman" panose="02020603050405020304" pitchFamily="18" charset="0"/>
+                <a:cs typeface="Times New Roman" panose="02020603050405020304" pitchFamily="18" charset="0"/>
+              </a:rPr>
+              <a:t>S</a:t>
+            </a:r>
+            <a:r>
+              <a:rPr lang="en-US" sz="2400" dirty="0">
+                <a:latin typeface="Times New Roman" panose="02020603050405020304" pitchFamily="18" charset="0"/>
+                <a:cs typeface="Times New Roman" panose="02020603050405020304" pitchFamily="18" charset="0"/>
+              </a:rPr>
+              <a:t>calar function of one variable</a:t>
+            </a:r>
+          </a:p>
+          <a:p>
+            <a:pPr lvl="2">
+              <a:lnSpc>
+                <a:spcPct val="120000"/>
+              </a:lnSpc>
+              <a:buFont typeface="Arial" panose="020B0604020202020204" pitchFamily="34" charset="0"/>
+              <a:buChar char="•"/>
+            </a:pPr>
+            <a:r>
+              <a:rPr lang="en-US" altLang="zh-CN" sz="2100" dirty="0">
+                <a:latin typeface="Times New Roman" panose="02020603050405020304" pitchFamily="18" charset="0"/>
+                <a:cs typeface="Times New Roman" panose="02020603050405020304" pitchFamily="18" charset="0"/>
+              </a:rPr>
+              <a:t>f</a:t>
+            </a:r>
+            <a:r>
+              <a:rPr lang="zh-CN" altLang="en-US" sz="2100" dirty="0">
+                <a:latin typeface="Times New Roman" panose="02020603050405020304" pitchFamily="18" charset="0"/>
+                <a:cs typeface="Times New Roman" panose="02020603050405020304" pitchFamily="18" charset="0"/>
+              </a:rPr>
+              <a:t> </a:t>
+            </a:r>
+            <a:r>
+              <a:rPr lang="en-US" altLang="zh-CN" sz="2100" dirty="0">
+                <a:latin typeface="Times New Roman" panose="02020603050405020304" pitchFamily="18" charset="0"/>
+                <a:cs typeface="Times New Roman" panose="02020603050405020304" pitchFamily="18" charset="0"/>
+              </a:rPr>
+              <a:t>=</a:t>
+            </a:r>
+            <a:r>
+              <a:rPr lang="zh-CN" altLang="en-US" sz="2100" dirty="0">
+                <a:latin typeface="Times New Roman" panose="02020603050405020304" pitchFamily="18" charset="0"/>
+                <a:cs typeface="Times New Roman" panose="02020603050405020304" pitchFamily="18" charset="0"/>
+              </a:rPr>
+              <a:t> </a:t>
+            </a:r>
+            <a:r>
+              <a:rPr lang="en-US" altLang="zh-CN" sz="2100" dirty="0">
+                <a:latin typeface="Times New Roman" panose="02020603050405020304" pitchFamily="18" charset="0"/>
+                <a:cs typeface="Times New Roman" panose="02020603050405020304" pitchFamily="18" charset="0"/>
+              </a:rPr>
+              <a:t>sin(2x)</a:t>
+            </a:r>
+            <a:endParaRPr lang="en-US" sz="2100" dirty="0">
               <a:latin typeface="Times New Roman" panose="02020603050405020304" pitchFamily="18" charset="0"/>
               <a:cs typeface="Times New Roman" panose="02020603050405020304" pitchFamily="18" charset="0"/>
             </a:endParaRPr>
           </a:p>
           <a:p>
-            <a:r>
-              <a:rPr lang="en-US" sz="2000" dirty="0">
-                <a:latin typeface="Times New Roman" panose="02020603050405020304" pitchFamily="18" charset="0"/>
-                <a:cs typeface="Times New Roman" panose="02020603050405020304" pitchFamily="18" charset="0"/>
-              </a:rPr>
-              <a:t>Trig functions </a:t>
-            </a:r>
-            <a:r>
-              <a:rPr lang="en-US" altLang="zh-CN" sz="2000" dirty="0">
-                <a:latin typeface="Times New Roman" panose="02020603050405020304" pitchFamily="18" charset="0"/>
-                <a:cs typeface="Times New Roman" panose="02020603050405020304" pitchFamily="18" charset="0"/>
-              </a:rPr>
-              <a:t>(sin,</a:t>
-            </a:r>
-            <a:r>
-              <a:rPr lang="zh-CN" altLang="en-US" sz="2000" dirty="0">
-                <a:latin typeface="Times New Roman" panose="02020603050405020304" pitchFamily="18" charset="0"/>
-                <a:cs typeface="Times New Roman" panose="02020603050405020304" pitchFamily="18" charset="0"/>
-              </a:rPr>
-              <a:t> </a:t>
-            </a:r>
-            <a:r>
-              <a:rPr lang="en-US" altLang="zh-CN" sz="2000" dirty="0">
-                <a:latin typeface="Times New Roman" panose="02020603050405020304" pitchFamily="18" charset="0"/>
-                <a:cs typeface="Times New Roman" panose="02020603050405020304" pitchFamily="18" charset="0"/>
-              </a:rPr>
-              <a:t>cos,</a:t>
-            </a:r>
-            <a:r>
-              <a:rPr lang="zh-CN" altLang="en-US" sz="2000" dirty="0">
-                <a:latin typeface="Times New Roman" panose="02020603050405020304" pitchFamily="18" charset="0"/>
-                <a:cs typeface="Times New Roman" panose="02020603050405020304" pitchFamily="18" charset="0"/>
-              </a:rPr>
-              <a:t> </a:t>
-            </a:r>
-            <a:r>
-              <a:rPr lang="en-US" altLang="zh-CN" sz="2000" dirty="0">
-                <a:latin typeface="Times New Roman" panose="02020603050405020304" pitchFamily="18" charset="0"/>
-                <a:cs typeface="Times New Roman" panose="02020603050405020304" pitchFamily="18" charset="0"/>
-              </a:rPr>
-              <a:t>tan)</a:t>
-            </a:r>
-            <a:endParaRPr lang="en-US" sz="2000" dirty="0">
-              <a:latin typeface="Times New Roman" panose="02020603050405020304" pitchFamily="18" charset="0"/>
-              <a:cs typeface="Times New Roman" panose="02020603050405020304" pitchFamily="18" charset="0"/>
-            </a:endParaRPr>
-          </a:p>
-          <a:p>
-            <a:r>
-              <a:rPr lang="en-US" sz="2000" dirty="0">
-                <a:latin typeface="Times New Roman" panose="02020603050405020304" pitchFamily="18" charset="0"/>
-                <a:cs typeface="Times New Roman" panose="02020603050405020304" pitchFamily="18" charset="0"/>
-              </a:rPr>
-              <a:t>Inverse trig functions</a:t>
-            </a:r>
-            <a:r>
-              <a:rPr lang="zh-CN" altLang="en-US" sz="2000" dirty="0">
-                <a:latin typeface="Times New Roman" panose="02020603050405020304" pitchFamily="18" charset="0"/>
-                <a:cs typeface="Times New Roman" panose="02020603050405020304" pitchFamily="18" charset="0"/>
-              </a:rPr>
-              <a:t> </a:t>
-            </a:r>
-            <a:r>
-              <a:rPr lang="en-US" altLang="zh-CN" sz="2000" dirty="0">
-                <a:latin typeface="Times New Roman" panose="02020603050405020304" pitchFamily="18" charset="0"/>
-                <a:cs typeface="Times New Roman" panose="02020603050405020304" pitchFamily="18" charset="0"/>
-              </a:rPr>
-              <a:t>(arcsin,</a:t>
-            </a:r>
-            <a:r>
-              <a:rPr lang="zh-CN" altLang="en-US" sz="2000" dirty="0">
-                <a:latin typeface="Times New Roman" panose="02020603050405020304" pitchFamily="18" charset="0"/>
-                <a:cs typeface="Times New Roman" panose="02020603050405020304" pitchFamily="18" charset="0"/>
-              </a:rPr>
-              <a:t> </a:t>
-            </a:r>
-            <a:r>
-              <a:rPr lang="en-US" altLang="zh-CN" sz="2000" dirty="0">
-                <a:latin typeface="Times New Roman" panose="02020603050405020304" pitchFamily="18" charset="0"/>
-                <a:cs typeface="Times New Roman" panose="02020603050405020304" pitchFamily="18" charset="0"/>
-              </a:rPr>
-              <a:t>arccos,</a:t>
-            </a:r>
-            <a:r>
-              <a:rPr lang="zh-CN" altLang="en-US" sz="2000" dirty="0">
-                <a:latin typeface="Times New Roman" panose="02020603050405020304" pitchFamily="18" charset="0"/>
-                <a:cs typeface="Times New Roman" panose="02020603050405020304" pitchFamily="18" charset="0"/>
-              </a:rPr>
-              <a:t> </a:t>
-            </a:r>
-            <a:r>
-              <a:rPr lang="en-US" altLang="zh-CN" sz="2000" dirty="0">
-                <a:latin typeface="Times New Roman" panose="02020603050405020304" pitchFamily="18" charset="0"/>
-                <a:cs typeface="Times New Roman" panose="02020603050405020304" pitchFamily="18" charset="0"/>
-              </a:rPr>
-              <a:t>arctan)</a:t>
-            </a:r>
-            <a:endParaRPr lang="en-US" sz="2000" dirty="0">
-              <a:latin typeface="Times New Roman" panose="02020603050405020304" pitchFamily="18" charset="0"/>
-              <a:cs typeface="Times New Roman" panose="02020603050405020304" pitchFamily="18" charset="0"/>
-            </a:endParaRPr>
-          </a:p>
-          <a:p>
-            <a:r>
-              <a:rPr lang="en-US" sz="2000" dirty="0">
-                <a:latin typeface="Times New Roman" panose="02020603050405020304" pitchFamily="18" charset="0"/>
-                <a:cs typeface="Times New Roman" panose="02020603050405020304" pitchFamily="18" charset="0"/>
-              </a:rPr>
-              <a:t>Hyperbolic functions (sinh, cosh, tanh)</a:t>
-            </a:r>
-          </a:p>
-          <a:p>
-            <a:r>
-              <a:rPr lang="en-US" sz="2000" dirty="0">
-                <a:latin typeface="Times New Roman" panose="02020603050405020304" pitchFamily="18" charset="0"/>
-                <a:cs typeface="Times New Roman" panose="02020603050405020304" pitchFamily="18" charset="0"/>
-              </a:rPr>
-              <a:t>Exponentials</a:t>
-            </a:r>
-            <a:r>
-              <a:rPr lang="zh-CN" altLang="en-US" sz="2000" dirty="0">
-                <a:latin typeface="Times New Roman" panose="02020603050405020304" pitchFamily="18" charset="0"/>
-                <a:cs typeface="Times New Roman" panose="02020603050405020304" pitchFamily="18" charset="0"/>
-              </a:rPr>
-              <a:t> </a:t>
-            </a:r>
-            <a:r>
-              <a:rPr lang="en-US" altLang="zh-CN" sz="2000" dirty="0">
-                <a:latin typeface="Times New Roman" panose="02020603050405020304" pitchFamily="18" charset="0"/>
-                <a:cs typeface="Times New Roman" panose="02020603050405020304" pitchFamily="18" charset="0"/>
-              </a:rPr>
-              <a:t>(of</a:t>
-            </a:r>
-            <a:r>
-              <a:rPr lang="zh-CN" altLang="en-US" sz="2000" dirty="0">
-                <a:latin typeface="Times New Roman" panose="02020603050405020304" pitchFamily="18" charset="0"/>
-                <a:cs typeface="Times New Roman" panose="02020603050405020304" pitchFamily="18" charset="0"/>
-              </a:rPr>
-              <a:t> </a:t>
-            </a:r>
-            <a:r>
-              <a:rPr lang="en-US" altLang="zh-CN" sz="2000" dirty="0">
-                <a:latin typeface="Times New Roman" panose="02020603050405020304" pitchFamily="18" charset="0"/>
-                <a:cs typeface="Times New Roman" panose="02020603050405020304" pitchFamily="18" charset="0"/>
-              </a:rPr>
-              <a:t>any</a:t>
-            </a:r>
-            <a:r>
-              <a:rPr lang="zh-CN" altLang="en-US" sz="2000" dirty="0">
-                <a:latin typeface="Times New Roman" panose="02020603050405020304" pitchFamily="18" charset="0"/>
-                <a:cs typeface="Times New Roman" panose="02020603050405020304" pitchFamily="18" charset="0"/>
-              </a:rPr>
-              <a:t> </a:t>
-            </a:r>
-            <a:r>
-              <a:rPr lang="en-US" altLang="zh-CN" sz="2000" dirty="0">
-                <a:latin typeface="Times New Roman" panose="02020603050405020304" pitchFamily="18" charset="0"/>
-                <a:cs typeface="Times New Roman" panose="02020603050405020304" pitchFamily="18" charset="0"/>
-              </a:rPr>
-              <a:t>base)</a:t>
-            </a:r>
-          </a:p>
-          <a:p>
-            <a:r>
-              <a:rPr lang="en-US" sz="2000" dirty="0">
-                <a:latin typeface="Times New Roman" panose="02020603050405020304" pitchFamily="18" charset="0"/>
-                <a:cs typeface="Times New Roman" panose="02020603050405020304" pitchFamily="18" charset="0"/>
-              </a:rPr>
-              <a:t>Logarithms</a:t>
-            </a:r>
-            <a:r>
-              <a:rPr lang="zh-CN" altLang="en-US" sz="2000" dirty="0">
-                <a:latin typeface="Times New Roman" panose="02020603050405020304" pitchFamily="18" charset="0"/>
-                <a:cs typeface="Times New Roman" panose="02020603050405020304" pitchFamily="18" charset="0"/>
-              </a:rPr>
-              <a:t> </a:t>
-            </a:r>
-            <a:r>
-              <a:rPr lang="en-US" altLang="zh-CN" sz="2000" dirty="0">
-                <a:latin typeface="Times New Roman" panose="02020603050405020304" pitchFamily="18" charset="0"/>
-                <a:cs typeface="Times New Roman" panose="02020603050405020304" pitchFamily="18" charset="0"/>
-              </a:rPr>
-              <a:t>(of</a:t>
-            </a:r>
-            <a:r>
-              <a:rPr lang="zh-CN" altLang="en-US" sz="2000" dirty="0">
-                <a:latin typeface="Times New Roman" panose="02020603050405020304" pitchFamily="18" charset="0"/>
-                <a:cs typeface="Times New Roman" panose="02020603050405020304" pitchFamily="18" charset="0"/>
-              </a:rPr>
-              <a:t> </a:t>
-            </a:r>
-            <a:r>
-              <a:rPr lang="en-US" altLang="zh-CN" sz="2000" dirty="0">
-                <a:latin typeface="Times New Roman" panose="02020603050405020304" pitchFamily="18" charset="0"/>
-                <a:cs typeface="Times New Roman" panose="02020603050405020304" pitchFamily="18" charset="0"/>
-              </a:rPr>
-              <a:t>any</a:t>
-            </a:r>
-            <a:r>
-              <a:rPr lang="zh-CN" altLang="en-US" sz="2000" dirty="0">
-                <a:latin typeface="Times New Roman" panose="02020603050405020304" pitchFamily="18" charset="0"/>
-                <a:cs typeface="Times New Roman" panose="02020603050405020304" pitchFamily="18" charset="0"/>
-              </a:rPr>
-              <a:t> </a:t>
-            </a:r>
-            <a:r>
-              <a:rPr lang="en-US" altLang="zh-CN" sz="2000" dirty="0">
-                <a:latin typeface="Times New Roman" panose="02020603050405020304" pitchFamily="18" charset="0"/>
-                <a:cs typeface="Times New Roman" panose="02020603050405020304" pitchFamily="18" charset="0"/>
-              </a:rPr>
-              <a:t>base)</a:t>
-            </a:r>
-            <a:endParaRPr lang="en-US" sz="2000" dirty="0">
-              <a:latin typeface="Times New Roman" panose="02020603050405020304" pitchFamily="18" charset="0"/>
-              <a:cs typeface="Times New Roman" panose="02020603050405020304" pitchFamily="18" charset="0"/>
-            </a:endParaRPr>
-          </a:p>
-          <a:p>
-            <a:r>
-              <a:rPr lang="en-US" sz="2000" dirty="0">
-                <a:latin typeface="Times New Roman" panose="02020603050405020304" pitchFamily="18" charset="0"/>
-                <a:cs typeface="Times New Roman" panose="02020603050405020304" pitchFamily="18" charset="0"/>
-              </a:rPr>
-              <a:t>Square root</a:t>
-            </a:r>
-          </a:p>
-          <a:p>
-            <a:r>
-              <a:rPr lang="en-US" sz="2000" dirty="0">
-                <a:latin typeface="Times New Roman" panose="02020603050405020304" pitchFamily="18" charset="0"/>
-                <a:cs typeface="Times New Roman" panose="02020603050405020304" pitchFamily="18" charset="0"/>
-              </a:rPr>
-              <a:t>Logistic</a:t>
-            </a:r>
-            <a:r>
-              <a:rPr lang="zh-CN" altLang="en-US" sz="2000" dirty="0">
-                <a:latin typeface="Times New Roman" panose="02020603050405020304" pitchFamily="18" charset="0"/>
-                <a:cs typeface="Times New Roman" panose="02020603050405020304" pitchFamily="18" charset="0"/>
-              </a:rPr>
-              <a:t> </a:t>
-            </a:r>
-            <a:r>
-              <a:rPr lang="en-US" altLang="zh-CN" sz="2000" dirty="0">
-                <a:latin typeface="Times New Roman" panose="02020603050405020304" pitchFamily="18" charset="0"/>
-                <a:cs typeface="Times New Roman" panose="02020603050405020304" pitchFamily="18" charset="0"/>
-              </a:rPr>
-              <a:t>function</a:t>
-            </a:r>
-            <a:endParaRPr lang="en-US" sz="2000" dirty="0">
-              <a:latin typeface="Times New Roman" panose="02020603050405020304" pitchFamily="18" charset="0"/>
-              <a:cs typeface="Times New Roman" panose="02020603050405020304" pitchFamily="18" charset="0"/>
-            </a:endParaRPr>
-          </a:p>
-          <a:p>
-            <a:r>
-              <a:rPr lang="en-US" altLang="zh-CN" sz="2000" dirty="0">
-                <a:latin typeface="Times New Roman" panose="02020603050405020304" pitchFamily="18" charset="0"/>
-                <a:cs typeface="Times New Roman" panose="02020603050405020304" pitchFamily="18" charset="0"/>
-              </a:rPr>
-              <a:t>Comparison</a:t>
-            </a:r>
-            <a:r>
-              <a:rPr lang="zh-CN" altLang="en-US" sz="2000" dirty="0">
-                <a:latin typeface="Times New Roman" panose="02020603050405020304" pitchFamily="18" charset="0"/>
-                <a:cs typeface="Times New Roman" panose="02020603050405020304" pitchFamily="18" charset="0"/>
-              </a:rPr>
-              <a:t> </a:t>
-            </a:r>
-            <a:r>
-              <a:rPr lang="en-US" altLang="zh-CN" sz="2000" dirty="0">
-                <a:latin typeface="Times New Roman" panose="02020603050405020304" pitchFamily="18" charset="0"/>
-                <a:cs typeface="Times New Roman" panose="02020603050405020304" pitchFamily="18" charset="0"/>
-              </a:rPr>
-              <a:t>(equal</a:t>
-            </a:r>
-            <a:r>
-              <a:rPr lang="zh-CN" altLang="en-US" sz="2000" dirty="0">
-                <a:latin typeface="Times New Roman" panose="02020603050405020304" pitchFamily="18" charset="0"/>
-                <a:cs typeface="Times New Roman" panose="02020603050405020304" pitchFamily="18" charset="0"/>
-              </a:rPr>
-              <a:t> </a:t>
-            </a:r>
-            <a:r>
-              <a:rPr lang="en-US" altLang="zh-CN" sz="2000" dirty="0">
-                <a:latin typeface="Times New Roman" panose="02020603050405020304" pitchFamily="18" charset="0"/>
-                <a:cs typeface="Times New Roman" panose="02020603050405020304" pitchFamily="18" charset="0"/>
-              </a:rPr>
-              <a:t>&amp;</a:t>
-            </a:r>
-            <a:r>
-              <a:rPr lang="zh-CN" altLang="en-US" sz="2000" dirty="0">
-                <a:latin typeface="Times New Roman" panose="02020603050405020304" pitchFamily="18" charset="0"/>
-                <a:cs typeface="Times New Roman" panose="02020603050405020304" pitchFamily="18" charset="0"/>
-              </a:rPr>
-              <a:t> </a:t>
-            </a:r>
-            <a:r>
-              <a:rPr lang="en-US" altLang="zh-CN" sz="2000" dirty="0">
-                <a:latin typeface="Times New Roman" panose="02020603050405020304" pitchFamily="18" charset="0"/>
-                <a:cs typeface="Times New Roman" panose="02020603050405020304" pitchFamily="18" charset="0"/>
-              </a:rPr>
-              <a:t>not</a:t>
-            </a:r>
-            <a:r>
-              <a:rPr lang="zh-CN" altLang="en-US" sz="2000" dirty="0">
-                <a:latin typeface="Times New Roman" panose="02020603050405020304" pitchFamily="18" charset="0"/>
-                <a:cs typeface="Times New Roman" panose="02020603050405020304" pitchFamily="18" charset="0"/>
-              </a:rPr>
-              <a:t> </a:t>
-            </a:r>
-            <a:r>
-              <a:rPr lang="en-US" altLang="zh-CN" sz="2000" dirty="0">
-                <a:latin typeface="Times New Roman" panose="02020603050405020304" pitchFamily="18" charset="0"/>
-                <a:cs typeface="Times New Roman" panose="02020603050405020304" pitchFamily="18" charset="0"/>
-              </a:rPr>
-              <a:t>equal)</a:t>
-            </a:r>
-            <a:endParaRPr lang="en-US" sz="2000" dirty="0">
-              <a:latin typeface="Times New Roman" panose="02020603050405020304" pitchFamily="18" charset="0"/>
-              <a:cs typeface="Times New Roman" panose="02020603050405020304" pitchFamily="18" charset="0"/>
-            </a:endParaRPr>
+            <a:pPr>
+              <a:lnSpc>
+                <a:spcPct val="120000"/>
+              </a:lnSpc>
+              <a:buFont typeface="Courier New" panose="02070309020205020404" pitchFamily="49" charset="0"/>
+              <a:buChar char="o"/>
+            </a:pPr>
+            <a:r>
+              <a:rPr lang="en-US" sz="2400" dirty="0">
+                <a:latin typeface="Times New Roman" panose="02020603050405020304" pitchFamily="18" charset="0"/>
+                <a:cs typeface="Times New Roman" panose="02020603050405020304" pitchFamily="18" charset="0"/>
+              </a:rPr>
+              <a:t> </a:t>
+            </a:r>
+            <a:r>
+              <a:rPr lang="en-US" altLang="zh-CN" sz="2400" dirty="0">
+                <a:latin typeface="Times New Roman" panose="02020603050405020304" pitchFamily="18" charset="0"/>
+                <a:cs typeface="Times New Roman" panose="02020603050405020304" pitchFamily="18" charset="0"/>
+              </a:rPr>
+              <a:t>S</a:t>
+            </a:r>
+            <a:r>
+              <a:rPr lang="en-US" sz="2400" dirty="0">
+                <a:latin typeface="Times New Roman" panose="02020603050405020304" pitchFamily="18" charset="0"/>
+                <a:cs typeface="Times New Roman" panose="02020603050405020304" pitchFamily="18" charset="0"/>
+              </a:rPr>
+              <a:t>calar function</a:t>
+            </a:r>
+            <a:r>
+              <a:rPr lang="zh-CN" altLang="en-US" sz="2400" dirty="0">
+                <a:latin typeface="Times New Roman" panose="02020603050405020304" pitchFamily="18" charset="0"/>
+                <a:cs typeface="Times New Roman" panose="02020603050405020304" pitchFamily="18" charset="0"/>
+              </a:rPr>
+              <a:t> </a:t>
+            </a:r>
+            <a:r>
+              <a:rPr lang="en-US" altLang="zh-CN" sz="2400" dirty="0">
+                <a:latin typeface="Times New Roman" panose="02020603050405020304" pitchFamily="18" charset="0"/>
+                <a:cs typeface="Times New Roman" panose="02020603050405020304" pitchFamily="18" charset="0"/>
+              </a:rPr>
+              <a:t>of</a:t>
+            </a:r>
+            <a:r>
+              <a:rPr lang="zh-CN" altLang="en-US" sz="2400" dirty="0">
+                <a:latin typeface="Times New Roman" panose="02020603050405020304" pitchFamily="18" charset="0"/>
+                <a:cs typeface="Times New Roman" panose="02020603050405020304" pitchFamily="18" charset="0"/>
+              </a:rPr>
+              <a:t> </a:t>
+            </a:r>
+            <a:r>
+              <a:rPr lang="en-US" altLang="zh-CN" sz="2400" dirty="0">
+                <a:latin typeface="Times New Roman" panose="02020603050405020304" pitchFamily="18" charset="0"/>
+                <a:cs typeface="Times New Roman" panose="02020603050405020304" pitchFamily="18" charset="0"/>
+              </a:rPr>
+              <a:t>multiple</a:t>
+            </a:r>
+            <a:r>
+              <a:rPr lang="zh-CN" altLang="en-US" sz="2400" dirty="0">
+                <a:latin typeface="Times New Roman" panose="02020603050405020304" pitchFamily="18" charset="0"/>
+                <a:cs typeface="Times New Roman" panose="02020603050405020304" pitchFamily="18" charset="0"/>
+              </a:rPr>
+              <a:t> </a:t>
+            </a:r>
+            <a:r>
+              <a:rPr lang="en-US" altLang="zh-CN" sz="2400" dirty="0">
+                <a:latin typeface="Times New Roman" panose="02020603050405020304" pitchFamily="18" charset="0"/>
+                <a:cs typeface="Times New Roman" panose="02020603050405020304" pitchFamily="18" charset="0"/>
+              </a:rPr>
+              <a:t>variables</a:t>
+            </a:r>
+          </a:p>
+          <a:p>
+            <a:pPr lvl="2">
+              <a:lnSpc>
+                <a:spcPct val="120000"/>
+              </a:lnSpc>
+              <a:buFont typeface="Arial" panose="020B0604020202020204" pitchFamily="34" charset="0"/>
+              <a:buChar char="•"/>
+            </a:pPr>
+            <a:r>
+              <a:rPr lang="en-US" altLang="zh-CN" sz="2100" dirty="0">
+                <a:latin typeface="Times New Roman" panose="02020603050405020304" pitchFamily="18" charset="0"/>
+                <a:cs typeface="Times New Roman" panose="02020603050405020304" pitchFamily="18" charset="0"/>
+              </a:rPr>
+              <a:t>f</a:t>
+            </a:r>
+            <a:r>
+              <a:rPr lang="zh-CN" altLang="en-US" sz="2100" dirty="0">
+                <a:latin typeface="Times New Roman" panose="02020603050405020304" pitchFamily="18" charset="0"/>
+                <a:cs typeface="Times New Roman" panose="02020603050405020304" pitchFamily="18" charset="0"/>
+              </a:rPr>
+              <a:t> </a:t>
+            </a:r>
+            <a:r>
+              <a:rPr lang="en-US" altLang="zh-CN" sz="2100" dirty="0">
+                <a:latin typeface="Times New Roman" panose="02020603050405020304" pitchFamily="18" charset="0"/>
+                <a:cs typeface="Times New Roman" panose="02020603050405020304" pitchFamily="18" charset="0"/>
+              </a:rPr>
+              <a:t>=</a:t>
+            </a:r>
+            <a:r>
+              <a:rPr lang="zh-CN" altLang="en-US" sz="2100" dirty="0">
+                <a:latin typeface="Times New Roman" panose="02020603050405020304" pitchFamily="18" charset="0"/>
+                <a:cs typeface="Times New Roman" panose="02020603050405020304" pitchFamily="18" charset="0"/>
+              </a:rPr>
+              <a:t> </a:t>
+            </a:r>
+            <a:r>
+              <a:rPr lang="en-US" altLang="zh-CN" sz="2100" dirty="0">
+                <a:latin typeface="Times New Roman" panose="02020603050405020304" pitchFamily="18" charset="0"/>
+                <a:cs typeface="Times New Roman" panose="02020603050405020304" pitchFamily="18" charset="0"/>
+              </a:rPr>
+              <a:t>sin(xy)</a:t>
+            </a:r>
+          </a:p>
+          <a:p>
+            <a:pPr>
+              <a:lnSpc>
+                <a:spcPct val="120000"/>
+              </a:lnSpc>
+              <a:buFont typeface="Courier New" panose="02070309020205020404" pitchFamily="49" charset="0"/>
+              <a:buChar char="o"/>
+            </a:pPr>
+            <a:r>
+              <a:rPr lang="zh-CN" altLang="en-US" sz="2400" dirty="0">
+                <a:latin typeface="Times New Roman" panose="02020603050405020304" pitchFamily="18" charset="0"/>
+                <a:cs typeface="Times New Roman" panose="02020603050405020304" pitchFamily="18" charset="0"/>
+              </a:rPr>
+              <a:t> </a:t>
+            </a:r>
+            <a:r>
+              <a:rPr lang="en-US" altLang="zh-CN" sz="2400" dirty="0">
+                <a:latin typeface="Times New Roman" panose="02020603050405020304" pitchFamily="18" charset="0"/>
+                <a:cs typeface="Times New Roman" panose="02020603050405020304" pitchFamily="18" charset="0"/>
+              </a:rPr>
+              <a:t>V</a:t>
+            </a:r>
+            <a:r>
+              <a:rPr lang="en-US" sz="2400" dirty="0">
+                <a:latin typeface="Times New Roman" panose="02020603050405020304" pitchFamily="18" charset="0"/>
+                <a:cs typeface="Times New Roman" panose="02020603050405020304" pitchFamily="18" charset="0"/>
+              </a:rPr>
+              <a:t>ector-valued function</a:t>
+            </a:r>
+            <a:r>
+              <a:rPr lang="zh-CN" altLang="en-US" sz="2400" dirty="0">
+                <a:latin typeface="Times New Roman" panose="02020603050405020304" pitchFamily="18" charset="0"/>
+                <a:cs typeface="Times New Roman" panose="02020603050405020304" pitchFamily="18" charset="0"/>
+              </a:rPr>
+              <a:t> </a:t>
+            </a:r>
+            <a:r>
+              <a:rPr lang="en-US" altLang="zh-CN" sz="2400" dirty="0">
+                <a:latin typeface="Times New Roman" panose="02020603050405020304" pitchFamily="18" charset="0"/>
+                <a:cs typeface="Times New Roman" panose="02020603050405020304" pitchFamily="18" charset="0"/>
+              </a:rPr>
+              <a:t>of</a:t>
+            </a:r>
+            <a:r>
+              <a:rPr lang="zh-CN" altLang="en-US" sz="2400" dirty="0">
+                <a:latin typeface="Times New Roman" panose="02020603050405020304" pitchFamily="18" charset="0"/>
+                <a:cs typeface="Times New Roman" panose="02020603050405020304" pitchFamily="18" charset="0"/>
+              </a:rPr>
+              <a:t> </a:t>
+            </a:r>
+            <a:r>
+              <a:rPr lang="en-US" altLang="zh-CN" sz="2400" dirty="0">
+                <a:latin typeface="Times New Roman" panose="02020603050405020304" pitchFamily="18" charset="0"/>
+                <a:cs typeface="Times New Roman" panose="02020603050405020304" pitchFamily="18" charset="0"/>
+              </a:rPr>
+              <a:t>multiple</a:t>
+            </a:r>
+            <a:r>
+              <a:rPr lang="zh-CN" altLang="en-US" sz="2400" dirty="0">
+                <a:latin typeface="Times New Roman" panose="02020603050405020304" pitchFamily="18" charset="0"/>
+                <a:cs typeface="Times New Roman" panose="02020603050405020304" pitchFamily="18" charset="0"/>
+              </a:rPr>
+              <a:t> </a:t>
+            </a:r>
+            <a:r>
+              <a:rPr lang="en-US" altLang="zh-CN" sz="2400" dirty="0">
+                <a:latin typeface="Times New Roman" panose="02020603050405020304" pitchFamily="18" charset="0"/>
+                <a:cs typeface="Times New Roman" panose="02020603050405020304" pitchFamily="18" charset="0"/>
+              </a:rPr>
+              <a:t>variables</a:t>
+            </a:r>
+          </a:p>
+          <a:p>
+            <a:pPr lvl="2">
+              <a:lnSpc>
+                <a:spcPct val="120000"/>
+              </a:lnSpc>
+              <a:buFont typeface="Arial" panose="020B0604020202020204" pitchFamily="34" charset="0"/>
+              <a:buChar char="•"/>
+            </a:pPr>
+            <a:r>
+              <a:rPr lang="en-US" altLang="zh-CN" sz="2100" dirty="0">
+                <a:latin typeface="Times New Roman" panose="02020603050405020304" pitchFamily="18" charset="0"/>
+                <a:cs typeface="Times New Roman" panose="02020603050405020304" pitchFamily="18" charset="0"/>
+              </a:rPr>
+              <a:t>f</a:t>
+            </a:r>
+            <a:r>
+              <a:rPr lang="zh-CN" altLang="en-US" sz="2100" dirty="0">
+                <a:latin typeface="Times New Roman" panose="02020603050405020304" pitchFamily="18" charset="0"/>
+                <a:cs typeface="Times New Roman" panose="02020603050405020304" pitchFamily="18" charset="0"/>
+              </a:rPr>
+              <a:t> </a:t>
+            </a:r>
+            <a:r>
+              <a:rPr lang="en-US" altLang="zh-CN" sz="2100" dirty="0">
+                <a:latin typeface="Times New Roman" panose="02020603050405020304" pitchFamily="18" charset="0"/>
+                <a:cs typeface="Times New Roman" panose="02020603050405020304" pitchFamily="18" charset="0"/>
+              </a:rPr>
+              <a:t>=</a:t>
+            </a:r>
+            <a:r>
+              <a:rPr lang="zh-CN" altLang="en-US" sz="2100" dirty="0">
+                <a:latin typeface="Times New Roman" panose="02020603050405020304" pitchFamily="18" charset="0"/>
+                <a:cs typeface="Times New Roman" panose="02020603050405020304" pitchFamily="18" charset="0"/>
+              </a:rPr>
+              <a:t> </a:t>
+            </a:r>
+            <a:r>
+              <a:rPr lang="en-US" altLang="zh-CN" sz="2100" dirty="0">
+                <a:latin typeface="Times New Roman" panose="02020603050405020304" pitchFamily="18" charset="0"/>
+                <a:cs typeface="Times New Roman" panose="02020603050405020304" pitchFamily="18" charset="0"/>
+              </a:rPr>
+              <a:t>[sin(2x),</a:t>
+            </a:r>
+            <a:r>
+              <a:rPr lang="zh-CN" altLang="en-US" sz="2100" dirty="0">
+                <a:latin typeface="Times New Roman" panose="02020603050405020304" pitchFamily="18" charset="0"/>
+                <a:cs typeface="Times New Roman" panose="02020603050405020304" pitchFamily="18" charset="0"/>
+              </a:rPr>
+              <a:t> </a:t>
+            </a:r>
+            <a:r>
+              <a:rPr lang="en-US" altLang="zh-CN" sz="2100" dirty="0">
+                <a:latin typeface="Times New Roman" panose="02020603050405020304" pitchFamily="18" charset="0"/>
+                <a:cs typeface="Times New Roman" panose="02020603050405020304" pitchFamily="18" charset="0"/>
+              </a:rPr>
+              <a:t>sin(xy)]</a:t>
+            </a:r>
+            <a:endParaRPr lang="en-US" b="1" dirty="0"/>
+          </a:p>
+          <a:p>
+            <a:pPr>
+              <a:lnSpc>
+                <a:spcPct val="120000"/>
+              </a:lnSpc>
+              <a:buFont typeface="Courier New" panose="02070309020205020404" pitchFamily="49" charset="0"/>
+              <a:buChar char="o"/>
+            </a:pPr>
+            <a:r>
+              <a:rPr lang="zh-CN" altLang="en-US" sz="2400" dirty="0">
+                <a:latin typeface="Times New Roman" panose="02020603050405020304" pitchFamily="18" charset="0"/>
+                <a:cs typeface="Times New Roman" panose="02020603050405020304" pitchFamily="18" charset="0"/>
+              </a:rPr>
+              <a:t> </a:t>
+            </a:r>
+            <a:r>
+              <a:rPr lang="en-US" altLang="zh-CN" sz="2400" dirty="0">
+                <a:latin typeface="Times New Roman" panose="02020603050405020304" pitchFamily="18" charset="0"/>
+                <a:cs typeface="Times New Roman" panose="02020603050405020304" pitchFamily="18" charset="0"/>
+              </a:rPr>
+              <a:t>Calculate</a:t>
+            </a:r>
+            <a:r>
+              <a:rPr lang="zh-CN" altLang="en-US" sz="2400" dirty="0">
+                <a:latin typeface="Times New Roman" panose="02020603050405020304" pitchFamily="18" charset="0"/>
+                <a:cs typeface="Times New Roman" panose="02020603050405020304" pitchFamily="18" charset="0"/>
+              </a:rPr>
+              <a:t> </a:t>
+            </a:r>
+            <a:r>
+              <a:rPr lang="en-US" altLang="zh-CN" sz="2400" dirty="0">
+                <a:latin typeface="Times New Roman" panose="02020603050405020304" pitchFamily="18" charset="0"/>
+                <a:cs typeface="Times New Roman" panose="02020603050405020304" pitchFamily="18" charset="0"/>
+              </a:rPr>
+              <a:t>the</a:t>
+            </a:r>
+            <a:r>
+              <a:rPr lang="zh-CN" altLang="en-US" sz="2400" dirty="0">
+                <a:latin typeface="Times New Roman" panose="02020603050405020304" pitchFamily="18" charset="0"/>
+                <a:cs typeface="Times New Roman" panose="02020603050405020304" pitchFamily="18" charset="0"/>
+              </a:rPr>
+              <a:t> </a:t>
+            </a:r>
+            <a:r>
+              <a:rPr lang="en-US" altLang="zh-CN" sz="2400" dirty="0">
+                <a:latin typeface="Times New Roman" panose="02020603050405020304" pitchFamily="18" charset="0"/>
+                <a:cs typeface="Times New Roman" panose="02020603050405020304" pitchFamily="18" charset="0"/>
+              </a:rPr>
+              <a:t>derivatives</a:t>
+            </a:r>
+            <a:r>
+              <a:rPr lang="zh-CN" altLang="en-US" sz="2400" dirty="0">
+                <a:latin typeface="Times New Roman" panose="02020603050405020304" pitchFamily="18" charset="0"/>
+                <a:cs typeface="Times New Roman" panose="02020603050405020304" pitchFamily="18" charset="0"/>
+              </a:rPr>
+              <a:t> </a:t>
+            </a:r>
+            <a:r>
+              <a:rPr lang="en-US" altLang="zh-CN" sz="2400" dirty="0">
+                <a:latin typeface="Times New Roman" panose="02020603050405020304" pitchFamily="18" charset="0"/>
+                <a:cs typeface="Times New Roman" panose="02020603050405020304" pitchFamily="18" charset="0"/>
+              </a:rPr>
+              <a:t>for</a:t>
+            </a:r>
+            <a:r>
+              <a:rPr lang="zh-CN" altLang="en-US" sz="2400" dirty="0">
+                <a:latin typeface="Times New Roman" panose="02020603050405020304" pitchFamily="18" charset="0"/>
+                <a:cs typeface="Times New Roman" panose="02020603050405020304" pitchFamily="18" charset="0"/>
+              </a:rPr>
+              <a:t> </a:t>
+            </a:r>
+            <a:r>
+              <a:rPr lang="en-US" altLang="zh-CN" sz="2400" dirty="0">
+                <a:latin typeface="Times New Roman" panose="02020603050405020304" pitchFamily="18" charset="0"/>
+                <a:cs typeface="Times New Roman" panose="02020603050405020304" pitchFamily="18" charset="0"/>
+              </a:rPr>
+              <a:t>a</a:t>
+            </a:r>
+            <a:r>
+              <a:rPr lang="en-US" sz="2400" dirty="0">
+                <a:latin typeface="Times New Roman" panose="02020603050405020304" pitchFamily="18" charset="0"/>
+                <a:cs typeface="Times New Roman" panose="02020603050405020304" pitchFamily="18" charset="0"/>
+              </a:rPr>
+              <a:t>ny </a:t>
+            </a:r>
+            <a:r>
+              <a:rPr lang="en-US" altLang="zh-CN" sz="2400" dirty="0">
+                <a:latin typeface="Times New Roman" panose="02020603050405020304" pitchFamily="18" charset="0"/>
+                <a:cs typeface="Times New Roman" panose="02020603050405020304" pitchFamily="18" charset="0"/>
+              </a:rPr>
+              <a:t>of</a:t>
+            </a:r>
+            <a:r>
+              <a:rPr lang="zh-CN" altLang="en-US" sz="2400" dirty="0">
+                <a:latin typeface="Times New Roman" panose="02020603050405020304" pitchFamily="18" charset="0"/>
+                <a:cs typeface="Times New Roman" panose="02020603050405020304" pitchFamily="18" charset="0"/>
+              </a:rPr>
+              <a:t> </a:t>
+            </a:r>
+            <a:r>
+              <a:rPr lang="en-US" altLang="zh-CN" sz="2400" dirty="0">
+                <a:latin typeface="Times New Roman" panose="02020603050405020304" pitchFamily="18" charset="0"/>
+                <a:cs typeface="Times New Roman" panose="02020603050405020304" pitchFamily="18" charset="0"/>
+              </a:rPr>
+              <a:t>the</a:t>
+            </a:r>
+            <a:r>
+              <a:rPr lang="zh-CN" altLang="en-US" sz="2400" dirty="0">
+                <a:latin typeface="Times New Roman" panose="02020603050405020304" pitchFamily="18" charset="0"/>
+                <a:cs typeface="Times New Roman" panose="02020603050405020304" pitchFamily="18" charset="0"/>
+              </a:rPr>
+              <a:t> </a:t>
+            </a:r>
+            <a:r>
+              <a:rPr lang="en-US" altLang="zh-CN" sz="2400" dirty="0">
+                <a:latin typeface="Times New Roman" panose="02020603050405020304" pitchFamily="18" charset="0"/>
+                <a:cs typeface="Times New Roman" panose="02020603050405020304" pitchFamily="18" charset="0"/>
+              </a:rPr>
+              <a:t>previous</a:t>
+            </a:r>
+            <a:r>
+              <a:rPr lang="zh-CN" altLang="en-US" sz="2400" dirty="0">
+                <a:latin typeface="Times New Roman" panose="02020603050405020304" pitchFamily="18" charset="0"/>
+                <a:cs typeface="Times New Roman" panose="02020603050405020304" pitchFamily="18" charset="0"/>
+              </a:rPr>
+              <a:t> </a:t>
+            </a:r>
+            <a:r>
+              <a:rPr lang="en-US" sz="2400" dirty="0">
+                <a:latin typeface="Times New Roman" panose="02020603050405020304" pitchFamily="18" charset="0"/>
+                <a:cs typeface="Times New Roman" panose="02020603050405020304" pitchFamily="18" charset="0"/>
+              </a:rPr>
+              <a:t>type of function</a:t>
+            </a:r>
+            <a:r>
+              <a:rPr lang="zh-CN" altLang="en-US" sz="2400" dirty="0">
+                <a:latin typeface="Times New Roman" panose="02020603050405020304" pitchFamily="18" charset="0"/>
+                <a:cs typeface="Times New Roman" panose="02020603050405020304" pitchFamily="18" charset="0"/>
+              </a:rPr>
+              <a:t> </a:t>
+            </a:r>
+            <a:r>
+              <a:rPr lang="en-US" sz="2400" dirty="0">
+                <a:latin typeface="Times New Roman" panose="02020603050405020304" pitchFamily="18" charset="0"/>
+                <a:cs typeface="Times New Roman" panose="02020603050405020304" pitchFamily="18" charset="0"/>
+              </a:rPr>
+              <a:t>on a grid of points</a:t>
+            </a:r>
+          </a:p>
+          <a:p>
+            <a:pPr lvl="2">
+              <a:lnSpc>
+                <a:spcPct val="120000"/>
+              </a:lnSpc>
+              <a:buFont typeface="Arial" panose="020B0604020202020204" pitchFamily="34" charset="0"/>
+              <a:buChar char="•"/>
+            </a:pPr>
+            <a:r>
+              <a:rPr lang="en-US" altLang="zh-CN" sz="2100" dirty="0">
+                <a:latin typeface="Times New Roman" panose="02020603050405020304" pitchFamily="18" charset="0"/>
+                <a:cs typeface="Times New Roman" panose="02020603050405020304" pitchFamily="18" charset="0"/>
+              </a:rPr>
+              <a:t>f</a:t>
+            </a:r>
+            <a:r>
+              <a:rPr lang="zh-CN" altLang="en-US" sz="2100" dirty="0">
+                <a:latin typeface="Times New Roman" panose="02020603050405020304" pitchFamily="18" charset="0"/>
+                <a:cs typeface="Times New Roman" panose="02020603050405020304" pitchFamily="18" charset="0"/>
+              </a:rPr>
+              <a:t> </a:t>
+            </a:r>
+            <a:r>
+              <a:rPr lang="en-US" altLang="zh-CN" sz="2100" dirty="0">
+                <a:latin typeface="Times New Roman" panose="02020603050405020304" pitchFamily="18" charset="0"/>
+                <a:cs typeface="Times New Roman" panose="02020603050405020304" pitchFamily="18" charset="0"/>
+              </a:rPr>
+              <a:t>=</a:t>
+            </a:r>
+            <a:r>
+              <a:rPr lang="zh-CN" altLang="en-US" sz="2100" dirty="0">
+                <a:latin typeface="Times New Roman" panose="02020603050405020304" pitchFamily="18" charset="0"/>
+                <a:cs typeface="Times New Roman" panose="02020603050405020304" pitchFamily="18" charset="0"/>
+              </a:rPr>
+              <a:t> </a:t>
+            </a:r>
+            <a:r>
+              <a:rPr lang="en-US" altLang="zh-CN" sz="2100" dirty="0">
+                <a:latin typeface="Times New Roman" panose="02020603050405020304" pitchFamily="18" charset="0"/>
+                <a:cs typeface="Times New Roman" panose="02020603050405020304" pitchFamily="18" charset="0"/>
+              </a:rPr>
+              <a:t>sin(xy),</a:t>
+            </a:r>
+            <a:r>
+              <a:rPr lang="zh-CN" altLang="en-US" sz="2100" dirty="0">
+                <a:latin typeface="Times New Roman" panose="02020603050405020304" pitchFamily="18" charset="0"/>
+                <a:cs typeface="Times New Roman" panose="02020603050405020304" pitchFamily="18" charset="0"/>
+              </a:rPr>
+              <a:t> </a:t>
+            </a:r>
+            <a:r>
+              <a:rPr lang="en-US" altLang="zh-CN" sz="2100" dirty="0">
+                <a:latin typeface="Times New Roman" panose="02020603050405020304" pitchFamily="18" charset="0"/>
+                <a:cs typeface="Times New Roman" panose="02020603050405020304" pitchFamily="18" charset="0"/>
+              </a:rPr>
+              <a:t>x</a:t>
+            </a:r>
+            <a:r>
+              <a:rPr lang="zh-CN" altLang="en-US" sz="2100" dirty="0">
+                <a:latin typeface="Times New Roman" panose="02020603050405020304" pitchFamily="18" charset="0"/>
+                <a:cs typeface="Times New Roman" panose="02020603050405020304" pitchFamily="18" charset="0"/>
+              </a:rPr>
+              <a:t> </a:t>
+            </a:r>
+            <a:r>
+              <a:rPr lang="en-US" altLang="zh-CN" sz="2100" dirty="0">
+                <a:latin typeface="Times New Roman" panose="02020603050405020304" pitchFamily="18" charset="0"/>
+                <a:cs typeface="Times New Roman" panose="02020603050405020304" pitchFamily="18" charset="0"/>
+              </a:rPr>
+              <a:t>=</a:t>
+            </a:r>
+            <a:r>
+              <a:rPr lang="zh-CN" altLang="en-US" sz="2100" dirty="0">
+                <a:latin typeface="Times New Roman" panose="02020603050405020304" pitchFamily="18" charset="0"/>
+                <a:cs typeface="Times New Roman" panose="02020603050405020304" pitchFamily="18" charset="0"/>
+              </a:rPr>
+              <a:t> </a:t>
+            </a:r>
+            <a:r>
+              <a:rPr lang="en-US" altLang="zh-CN" sz="2100" dirty="0">
+                <a:latin typeface="Times New Roman" panose="02020603050405020304" pitchFamily="18" charset="0"/>
+                <a:cs typeface="Times New Roman" panose="02020603050405020304" pitchFamily="18" charset="0"/>
+              </a:rPr>
+              <a:t>[1,2],</a:t>
+            </a:r>
+            <a:r>
+              <a:rPr lang="zh-CN" altLang="en-US" sz="2100" dirty="0">
+                <a:latin typeface="Times New Roman" panose="02020603050405020304" pitchFamily="18" charset="0"/>
+                <a:cs typeface="Times New Roman" panose="02020603050405020304" pitchFamily="18" charset="0"/>
+              </a:rPr>
+              <a:t>  </a:t>
+            </a:r>
+            <a:r>
+              <a:rPr lang="en-US" altLang="zh-CN" sz="2100" dirty="0">
+                <a:latin typeface="Times New Roman" panose="02020603050405020304" pitchFamily="18" charset="0"/>
+                <a:cs typeface="Times New Roman" panose="02020603050405020304" pitchFamily="18" charset="0"/>
+              </a:rPr>
+              <a:t>y</a:t>
+            </a:r>
+            <a:r>
+              <a:rPr lang="zh-CN" altLang="en-US" sz="2100" dirty="0">
+                <a:latin typeface="Times New Roman" panose="02020603050405020304" pitchFamily="18" charset="0"/>
+                <a:cs typeface="Times New Roman" panose="02020603050405020304" pitchFamily="18" charset="0"/>
+              </a:rPr>
+              <a:t> </a:t>
+            </a:r>
+            <a:r>
+              <a:rPr lang="en-US" altLang="zh-CN" sz="2100" dirty="0">
+                <a:latin typeface="Times New Roman" panose="02020603050405020304" pitchFamily="18" charset="0"/>
+                <a:cs typeface="Times New Roman" panose="02020603050405020304" pitchFamily="18" charset="0"/>
+              </a:rPr>
+              <a:t>=</a:t>
+            </a:r>
+            <a:r>
+              <a:rPr lang="zh-CN" altLang="en-US" sz="2100" dirty="0">
+                <a:latin typeface="Times New Roman" panose="02020603050405020304" pitchFamily="18" charset="0"/>
+                <a:cs typeface="Times New Roman" panose="02020603050405020304" pitchFamily="18" charset="0"/>
+              </a:rPr>
+              <a:t> </a:t>
+            </a:r>
+            <a:r>
+              <a:rPr lang="en-US" altLang="zh-CN" sz="2100" dirty="0">
+                <a:latin typeface="Times New Roman" panose="02020603050405020304" pitchFamily="18" charset="0"/>
+                <a:cs typeface="Times New Roman" panose="02020603050405020304" pitchFamily="18" charset="0"/>
+              </a:rPr>
+              <a:t>3</a:t>
+            </a:r>
+          </a:p>
+          <a:p>
+            <a:endParaRPr lang="en-US" dirty="0"/>
+          </a:p>
+        </p:txBody>
+      </p:sp>
+      <p:sp>
+        <p:nvSpPr>
+          <p:cNvPr id="4" name="Rectangle 3">
+            <a:extLst>
+              <a:ext uri="{FF2B5EF4-FFF2-40B4-BE49-F238E27FC236}">
+                <a16:creationId xmlns:a16="http://schemas.microsoft.com/office/drawing/2014/main" id="{4F67BBC0-4223-B740-AA8A-E8592D3A1D74}"/>
+              </a:ext>
+            </a:extLst>
+          </p:cNvPr>
+          <p:cNvSpPr/>
+          <p:nvPr/>
+        </p:nvSpPr>
+        <p:spPr>
+          <a:xfrm>
+            <a:off x="10195560" y="642594"/>
+            <a:ext cx="1428750" cy="568986"/>
+          </a:xfrm>
+          <a:prstGeom prst="rect">
+            <a:avLst/>
+          </a:prstGeom>
+        </p:spPr>
+        <p:style>
+          <a:lnRef idx="2">
+            <a:schemeClr val="accent1">
+              <a:shade val="50000"/>
+            </a:schemeClr>
+          </a:lnRef>
+          <a:fillRef idx="1">
+            <a:schemeClr val="accent1"/>
+          </a:fillRef>
+          <a:effectRef idx="0">
+            <a:schemeClr val="accent1"/>
+          </a:effectRef>
+          <a:fontRef idx="minor">
+            <a:schemeClr val="lt1"/>
+          </a:fontRef>
+        </p:style>
+        <p:txBody>
+          <a:bodyPr rtlCol="0" anchor="ctr"/>
+          <a:lstStyle/>
+          <a:p>
+            <a:pPr algn="ctr"/>
+            <a:r>
+              <a:rPr lang="en-US" altLang="zh-CN" dirty="0"/>
+              <a:t>Y</a:t>
+            </a:r>
           </a:p>
         </p:txBody>
       </p:sp>
     </p:spTree>
     <p:extLst>
       <p:ext uri="{BB962C8B-B14F-4D97-AF65-F5344CB8AC3E}">
-        <p14:creationId xmlns:p14="http://schemas.microsoft.com/office/powerpoint/2010/main" val="2023197500"/>
+        <p14:creationId xmlns:p14="http://schemas.microsoft.com/office/powerpoint/2010/main" val="529316642"/>
       </p:ext>
     </p:extLst>
   </p:cSld>
@@ -8326,7 +8205,7 @@
           <p:cNvPr id="2" name="Title 1">
             <a:extLst>
               <a:ext uri="{FF2B5EF4-FFF2-40B4-BE49-F238E27FC236}">
-                <a16:creationId xmlns:a16="http://schemas.microsoft.com/office/drawing/2014/main" id="{2B5059BD-2BF5-6147-99F1-8FE6C03876C7}"/>
+                <a16:creationId xmlns:a16="http://schemas.microsoft.com/office/drawing/2014/main" id="{95B23324-E895-1C42-BF37-BF602B03E7FB}"/>
               </a:ext>
             </a:extLst>
           </p:cNvPr>
@@ -8337,12 +8216,7 @@
             <p:ph type="title"/>
           </p:nvPr>
         </p:nvSpPr>
-        <p:spPr>
-          <a:xfrm>
-            <a:off x="1066800" y="642594"/>
-            <a:ext cx="10058400" cy="1371600"/>
-          </a:xfrm>
-        </p:spPr>
+        <p:spPr/>
         <p:txBody>
           <a:bodyPr/>
           <a:lstStyle/>
@@ -8383,6 +8257,13 @@
               <a:t>Use</a:t>
             </a:r>
             <a:r>
+              <a:rPr lang="zh-CN" altLang="en-US" dirty="0">
+                <a:latin typeface="Times New Roman" panose="02020603050405020304" pitchFamily="18" charset="0"/>
+                <a:cs typeface="Times New Roman" panose="02020603050405020304" pitchFamily="18" charset="0"/>
+              </a:rPr>
+              <a:t> </a:t>
+            </a:r>
+            <a:r>
               <a:rPr lang="en-US" altLang="zh-CN" b="0" dirty="0">
                 <a:latin typeface="Times New Roman" panose="02020603050405020304" pitchFamily="18" charset="0"/>
                 <a:cs typeface="Times New Roman" panose="02020603050405020304" pitchFamily="18" charset="0"/>
@@ -8401,7 +8282,7 @@
                 <a:latin typeface="Times New Roman" panose="02020603050405020304" pitchFamily="18" charset="0"/>
                 <a:cs typeface="Times New Roman" panose="02020603050405020304" pitchFamily="18" charset="0"/>
               </a:rPr>
-              <a:t>Code</a:t>
+              <a:t>Functions</a:t>
             </a:r>
             <a:r>
               <a:rPr lang="zh-CN" altLang="en-US" b="0" dirty="0">
@@ -8415,7 +8296,7 @@
                 <a:latin typeface="Times New Roman" panose="02020603050405020304" pitchFamily="18" charset="0"/>
                 <a:cs typeface="Times New Roman" panose="02020603050405020304" pitchFamily="18" charset="0"/>
               </a:rPr>
-              <a:t>Demo</a:t>
+              <a:t>supported</a:t>
             </a:r>
             <a:endParaRPr lang="en-US" b="0" dirty="0">
               <a:latin typeface="Times New Roman" panose="02020603050405020304" pitchFamily="18" charset="0"/>
@@ -8429,7 +8310,7 @@
           <p:cNvPr id="3" name="Content Placeholder 2">
             <a:extLst>
               <a:ext uri="{FF2B5EF4-FFF2-40B4-BE49-F238E27FC236}">
-                <a16:creationId xmlns:a16="http://schemas.microsoft.com/office/drawing/2014/main" id="{15D52ADB-10FF-2949-9464-0909D6AE14F4}"/>
+                <a16:creationId xmlns:a16="http://schemas.microsoft.com/office/drawing/2014/main" id="{9A1BD7D6-13F5-4541-A6CE-A4C0ABA63F42}"/>
               </a:ext>
             </a:extLst>
           </p:cNvPr>
@@ -8440,7 +8321,12 @@
             <p:ph idx="1"/>
           </p:nvPr>
         </p:nvSpPr>
-        <p:spPr/>
+        <p:spPr>
+          <a:xfrm>
+            <a:off x="1066800" y="2014194"/>
+            <a:ext cx="10058400" cy="4343744"/>
+          </a:xfrm>
+        </p:spPr>
         <p:txBody>
           <a:bodyPr>
             <a:normAutofit/>
@@ -8452,88 +8338,475 @@
                 <a:latin typeface="Times New Roman" panose="02020603050405020304" pitchFamily="18" charset="0"/>
                 <a:cs typeface="Times New Roman" panose="02020603050405020304" pitchFamily="18" charset="0"/>
               </a:rPr>
-              <a:t>x = Ad_Var(</a:t>
+              <a:t>Basic Operations</a:t>
+            </a:r>
+            <a:r>
+              <a:rPr lang="zh-CN" altLang="en-US" sz="2000" dirty="0">
+                <a:latin typeface="Times New Roman" panose="02020603050405020304" pitchFamily="18" charset="0"/>
+                <a:cs typeface="Times New Roman" panose="02020603050405020304" pitchFamily="18" charset="0"/>
+              </a:rPr>
+              <a:t> </a:t>
             </a:r>
             <a:r>
               <a:rPr lang="en-US" altLang="zh-CN" sz="2000" dirty="0">
                 <a:latin typeface="Times New Roman" panose="02020603050405020304" pitchFamily="18" charset="0"/>
                 <a:cs typeface="Times New Roman" panose="02020603050405020304" pitchFamily="18" charset="0"/>
               </a:rPr>
-              <a:t>2</a:t>
-            </a:r>
-            <a:r>
-              <a:rPr lang="en-US" sz="2000" dirty="0">
+              <a:t>(+,</a:t>
+            </a:r>
+            <a:r>
+              <a:rPr lang="zh-CN" altLang="en-US" sz="2000" dirty="0">
+                <a:latin typeface="Times New Roman" panose="02020603050405020304" pitchFamily="18" charset="0"/>
+                <a:cs typeface="Times New Roman" panose="02020603050405020304" pitchFamily="18" charset="0"/>
+              </a:rPr>
+              <a:t> </a:t>
+            </a:r>
+            <a:r>
+              <a:rPr lang="en-US" altLang="zh-CN" sz="2000" dirty="0">
+                <a:latin typeface="Times New Roman" panose="02020603050405020304" pitchFamily="18" charset="0"/>
+                <a:cs typeface="Times New Roman" panose="02020603050405020304" pitchFamily="18" charset="0"/>
+              </a:rPr>
+              <a:t>-</a:t>
+            </a:r>
+            <a:r>
+              <a:rPr lang="zh-CN" altLang="en-US" sz="2000" dirty="0">
+                <a:latin typeface="Times New Roman" panose="02020603050405020304" pitchFamily="18" charset="0"/>
+                <a:cs typeface="Times New Roman" panose="02020603050405020304" pitchFamily="18" charset="0"/>
+              </a:rPr>
+              <a:t> </a:t>
+            </a:r>
+            <a:r>
+              <a:rPr lang="en-US" altLang="zh-CN" sz="2000" dirty="0">
+                <a:latin typeface="Times New Roman" panose="02020603050405020304" pitchFamily="18" charset="0"/>
+                <a:cs typeface="Times New Roman" panose="02020603050405020304" pitchFamily="18" charset="0"/>
+              </a:rPr>
+              <a:t>,</a:t>
+            </a:r>
+            <a:r>
+              <a:rPr lang="zh-CN" altLang="en-US" sz="2000" dirty="0">
+                <a:latin typeface="Times New Roman" panose="02020603050405020304" pitchFamily="18" charset="0"/>
+                <a:cs typeface="Times New Roman" panose="02020603050405020304" pitchFamily="18" charset="0"/>
+              </a:rPr>
+              <a:t> *</a:t>
+            </a:r>
+            <a:r>
+              <a:rPr lang="en-US" altLang="zh-CN" sz="2000" dirty="0">
+                <a:latin typeface="Times New Roman" panose="02020603050405020304" pitchFamily="18" charset="0"/>
+                <a:cs typeface="Times New Roman" panose="02020603050405020304" pitchFamily="18" charset="0"/>
+              </a:rPr>
+              <a:t>,</a:t>
+            </a:r>
+            <a:r>
+              <a:rPr lang="zh-CN" altLang="en-US" sz="2000" dirty="0">
+                <a:latin typeface="Times New Roman" panose="02020603050405020304" pitchFamily="18" charset="0"/>
+                <a:cs typeface="Times New Roman" panose="02020603050405020304" pitchFamily="18" charset="0"/>
+              </a:rPr>
+              <a:t> </a:t>
+            </a:r>
+            <a:r>
+              <a:rPr lang="en-US" altLang="zh-CN" sz="2000" dirty="0">
+                <a:latin typeface="Times New Roman" panose="02020603050405020304" pitchFamily="18" charset="0"/>
+                <a:cs typeface="Times New Roman" panose="02020603050405020304" pitchFamily="18" charset="0"/>
+              </a:rPr>
+              <a:t>/,</a:t>
+            </a:r>
+            <a:r>
+              <a:rPr lang="zh-CN" altLang="en-US" sz="2000" dirty="0">
+                <a:latin typeface="Times New Roman" panose="02020603050405020304" pitchFamily="18" charset="0"/>
+                <a:cs typeface="Times New Roman" panose="02020603050405020304" pitchFamily="18" charset="0"/>
+              </a:rPr>
+              <a:t> **</a:t>
+            </a:r>
+            <a:r>
+              <a:rPr lang="en-US" altLang="zh-CN" sz="2000" dirty="0">
                 <a:latin typeface="Times New Roman" panose="02020603050405020304" pitchFamily="18" charset="0"/>
                 <a:cs typeface="Times New Roman" panose="02020603050405020304" pitchFamily="18" charset="0"/>
               </a:rPr>
               <a:t>)</a:t>
-            </a:r>
-          </a:p>
-          <a:p>
-            <a:r>
-              <a:rPr lang="en-US" sz="2000" dirty="0">
-                <a:latin typeface="Times New Roman" panose="02020603050405020304" pitchFamily="18" charset="0"/>
-                <a:cs typeface="Times New Roman" panose="02020603050405020304" pitchFamily="18" charset="0"/>
-              </a:rPr>
-              <a:t>f = (Ad_Var.sin(2*x))**2</a:t>
-            </a:r>
-          </a:p>
-          <a:p>
-            <a:r>
-              <a:rPr lang="en-US" sz="2000" dirty="0">
-                <a:latin typeface="Times New Roman" panose="02020603050405020304" pitchFamily="18" charset="0"/>
-                <a:cs typeface="Times New Roman" panose="02020603050405020304" pitchFamily="18" charset="0"/>
-              </a:rPr>
-              <a:t>print</a:t>
-            </a:r>
-            <a:r>
-              <a:rPr lang="zh-CN" altLang="en-US" sz="2000" dirty="0">
-                <a:latin typeface="Times New Roman" panose="02020603050405020304" pitchFamily="18" charset="0"/>
-                <a:cs typeface="Times New Roman" panose="02020603050405020304" pitchFamily="18" charset="0"/>
-              </a:rPr>
-              <a:t> </a:t>
-            </a:r>
-            <a:r>
-              <a:rPr lang="en-US" sz="2000" dirty="0">
-                <a:latin typeface="Times New Roman" panose="02020603050405020304" pitchFamily="18" charset="0"/>
-                <a:cs typeface="Times New Roman" panose="02020603050405020304" pitchFamily="18" charset="0"/>
-              </a:rPr>
-              <a:t>(f.get_val(), f.get_ders())</a:t>
-            </a:r>
-          </a:p>
-          <a:p>
-            <a:r>
-              <a:rPr lang="en-US" altLang="zh-CN" sz="2000" dirty="0">
-                <a:latin typeface="Times New Roman" panose="02020603050405020304" pitchFamily="18" charset="0"/>
-                <a:cs typeface="Times New Roman" panose="02020603050405020304" pitchFamily="18" charset="0"/>
-              </a:rPr>
-              <a:t>&gt;&gt;&gt;﻿</a:t>
-            </a:r>
-            <a:r>
-              <a:rPr lang="zh-CN" altLang="en-US" sz="2000" dirty="0">
-                <a:latin typeface="Times New Roman" panose="02020603050405020304" pitchFamily="18" charset="0"/>
-                <a:cs typeface="Times New Roman" panose="02020603050405020304" pitchFamily="18" charset="0"/>
-              </a:rPr>
-              <a:t> </a:t>
-            </a:r>
-            <a:r>
-              <a:rPr lang="en-US" altLang="zh-CN" sz="2000" dirty="0">
-                <a:latin typeface="Times New Roman" panose="02020603050405020304" pitchFamily="18" charset="0"/>
-                <a:cs typeface="Times New Roman" panose="02020603050405020304" pitchFamily="18" charset="0"/>
-              </a:rPr>
-              <a:t>0.5727500169043067 1.9787164932467636</a:t>
             </a:r>
             <a:endParaRPr lang="en-US" sz="2000" dirty="0">
               <a:latin typeface="Times New Roman" panose="02020603050405020304" pitchFamily="18" charset="0"/>
               <a:cs typeface="Times New Roman" panose="02020603050405020304" pitchFamily="18" charset="0"/>
             </a:endParaRPr>
           </a:p>
+          <a:p>
+            <a:r>
+              <a:rPr lang="en-US" sz="2000" dirty="0">
+                <a:latin typeface="Times New Roman" panose="02020603050405020304" pitchFamily="18" charset="0"/>
+                <a:cs typeface="Times New Roman" panose="02020603050405020304" pitchFamily="18" charset="0"/>
+              </a:rPr>
+              <a:t>Trig functions </a:t>
+            </a:r>
+            <a:r>
+              <a:rPr lang="en-US" altLang="zh-CN" sz="2000" dirty="0">
+                <a:latin typeface="Times New Roman" panose="02020603050405020304" pitchFamily="18" charset="0"/>
+                <a:cs typeface="Times New Roman" panose="02020603050405020304" pitchFamily="18" charset="0"/>
+              </a:rPr>
+              <a:t>(sin,</a:t>
+            </a:r>
+            <a:r>
+              <a:rPr lang="zh-CN" altLang="en-US" sz="2000" dirty="0">
+                <a:latin typeface="Times New Roman" panose="02020603050405020304" pitchFamily="18" charset="0"/>
+                <a:cs typeface="Times New Roman" panose="02020603050405020304" pitchFamily="18" charset="0"/>
+              </a:rPr>
+              <a:t> </a:t>
+            </a:r>
+            <a:r>
+              <a:rPr lang="en-US" altLang="zh-CN" sz="2000" dirty="0">
+                <a:latin typeface="Times New Roman" panose="02020603050405020304" pitchFamily="18" charset="0"/>
+                <a:cs typeface="Times New Roman" panose="02020603050405020304" pitchFamily="18" charset="0"/>
+              </a:rPr>
+              <a:t>cos,</a:t>
+            </a:r>
+            <a:r>
+              <a:rPr lang="zh-CN" altLang="en-US" sz="2000" dirty="0">
+                <a:latin typeface="Times New Roman" panose="02020603050405020304" pitchFamily="18" charset="0"/>
+                <a:cs typeface="Times New Roman" panose="02020603050405020304" pitchFamily="18" charset="0"/>
+              </a:rPr>
+              <a:t> </a:t>
+            </a:r>
+            <a:r>
+              <a:rPr lang="en-US" altLang="zh-CN" sz="2000" dirty="0">
+                <a:latin typeface="Times New Roman" panose="02020603050405020304" pitchFamily="18" charset="0"/>
+                <a:cs typeface="Times New Roman" panose="02020603050405020304" pitchFamily="18" charset="0"/>
+              </a:rPr>
+              <a:t>tan)</a:t>
+            </a:r>
+            <a:endParaRPr lang="en-US" sz="2000" dirty="0">
+              <a:latin typeface="Times New Roman" panose="02020603050405020304" pitchFamily="18" charset="0"/>
+              <a:cs typeface="Times New Roman" panose="02020603050405020304" pitchFamily="18" charset="0"/>
+            </a:endParaRPr>
+          </a:p>
+          <a:p>
+            <a:r>
+              <a:rPr lang="en-US" sz="2000" dirty="0">
+                <a:latin typeface="Times New Roman" panose="02020603050405020304" pitchFamily="18" charset="0"/>
+                <a:cs typeface="Times New Roman" panose="02020603050405020304" pitchFamily="18" charset="0"/>
+              </a:rPr>
+              <a:t>Inverse trig functions</a:t>
+            </a:r>
+            <a:r>
+              <a:rPr lang="zh-CN" altLang="en-US" sz="2000" dirty="0">
+                <a:latin typeface="Times New Roman" panose="02020603050405020304" pitchFamily="18" charset="0"/>
+                <a:cs typeface="Times New Roman" panose="02020603050405020304" pitchFamily="18" charset="0"/>
+              </a:rPr>
+              <a:t> </a:t>
+            </a:r>
+            <a:r>
+              <a:rPr lang="en-US" altLang="zh-CN" sz="2000" dirty="0">
+                <a:latin typeface="Times New Roman" panose="02020603050405020304" pitchFamily="18" charset="0"/>
+                <a:cs typeface="Times New Roman" panose="02020603050405020304" pitchFamily="18" charset="0"/>
+              </a:rPr>
+              <a:t>(arcsin,</a:t>
+            </a:r>
+            <a:r>
+              <a:rPr lang="zh-CN" altLang="en-US" sz="2000" dirty="0">
+                <a:latin typeface="Times New Roman" panose="02020603050405020304" pitchFamily="18" charset="0"/>
+                <a:cs typeface="Times New Roman" panose="02020603050405020304" pitchFamily="18" charset="0"/>
+              </a:rPr>
+              <a:t> </a:t>
+            </a:r>
+            <a:r>
+              <a:rPr lang="en-US" altLang="zh-CN" sz="2000" dirty="0">
+                <a:latin typeface="Times New Roman" panose="02020603050405020304" pitchFamily="18" charset="0"/>
+                <a:cs typeface="Times New Roman" panose="02020603050405020304" pitchFamily="18" charset="0"/>
+              </a:rPr>
+              <a:t>arccos,</a:t>
+            </a:r>
+            <a:r>
+              <a:rPr lang="zh-CN" altLang="en-US" sz="2000" dirty="0">
+                <a:latin typeface="Times New Roman" panose="02020603050405020304" pitchFamily="18" charset="0"/>
+                <a:cs typeface="Times New Roman" panose="02020603050405020304" pitchFamily="18" charset="0"/>
+              </a:rPr>
+              <a:t> </a:t>
+            </a:r>
+            <a:r>
+              <a:rPr lang="en-US" altLang="zh-CN" sz="2000" dirty="0">
+                <a:latin typeface="Times New Roman" panose="02020603050405020304" pitchFamily="18" charset="0"/>
+                <a:cs typeface="Times New Roman" panose="02020603050405020304" pitchFamily="18" charset="0"/>
+              </a:rPr>
+              <a:t>arctan)</a:t>
+            </a:r>
+            <a:endParaRPr lang="en-US" sz="2000" dirty="0">
+              <a:latin typeface="Times New Roman" panose="02020603050405020304" pitchFamily="18" charset="0"/>
+              <a:cs typeface="Times New Roman" panose="02020603050405020304" pitchFamily="18" charset="0"/>
+            </a:endParaRPr>
+          </a:p>
+          <a:p>
+            <a:r>
+              <a:rPr lang="en-US" sz="2000" dirty="0">
+                <a:latin typeface="Times New Roman" panose="02020603050405020304" pitchFamily="18" charset="0"/>
+                <a:cs typeface="Times New Roman" panose="02020603050405020304" pitchFamily="18" charset="0"/>
+              </a:rPr>
+              <a:t>Hyperbolic functions (sinh, cosh, tanh)</a:t>
+            </a:r>
+          </a:p>
+          <a:p>
+            <a:r>
+              <a:rPr lang="en-US" sz="2000" dirty="0">
+                <a:latin typeface="Times New Roman" panose="02020603050405020304" pitchFamily="18" charset="0"/>
+                <a:cs typeface="Times New Roman" panose="02020603050405020304" pitchFamily="18" charset="0"/>
+              </a:rPr>
+              <a:t>Exponentials</a:t>
+            </a:r>
+            <a:r>
+              <a:rPr lang="zh-CN" altLang="en-US" sz="2000" dirty="0">
+                <a:latin typeface="Times New Roman" panose="02020603050405020304" pitchFamily="18" charset="0"/>
+                <a:cs typeface="Times New Roman" panose="02020603050405020304" pitchFamily="18" charset="0"/>
+              </a:rPr>
+              <a:t> </a:t>
+            </a:r>
+            <a:r>
+              <a:rPr lang="en-US" altLang="zh-CN" sz="2000" dirty="0">
+                <a:latin typeface="Times New Roman" panose="02020603050405020304" pitchFamily="18" charset="0"/>
+                <a:cs typeface="Times New Roman" panose="02020603050405020304" pitchFamily="18" charset="0"/>
+              </a:rPr>
+              <a:t>(of</a:t>
+            </a:r>
+            <a:r>
+              <a:rPr lang="zh-CN" altLang="en-US" sz="2000" dirty="0">
+                <a:latin typeface="Times New Roman" panose="02020603050405020304" pitchFamily="18" charset="0"/>
+                <a:cs typeface="Times New Roman" panose="02020603050405020304" pitchFamily="18" charset="0"/>
+              </a:rPr>
+              <a:t> </a:t>
+            </a:r>
+            <a:r>
+              <a:rPr lang="en-US" altLang="zh-CN" sz="2000" dirty="0">
+                <a:latin typeface="Times New Roman" panose="02020603050405020304" pitchFamily="18" charset="0"/>
+                <a:cs typeface="Times New Roman" panose="02020603050405020304" pitchFamily="18" charset="0"/>
+              </a:rPr>
+              <a:t>any</a:t>
+            </a:r>
+            <a:r>
+              <a:rPr lang="zh-CN" altLang="en-US" sz="2000" dirty="0">
+                <a:latin typeface="Times New Roman" panose="02020603050405020304" pitchFamily="18" charset="0"/>
+                <a:cs typeface="Times New Roman" panose="02020603050405020304" pitchFamily="18" charset="0"/>
+              </a:rPr>
+              <a:t> </a:t>
+            </a:r>
+            <a:r>
+              <a:rPr lang="en-US" altLang="zh-CN" sz="2000" dirty="0">
+                <a:latin typeface="Times New Roman" panose="02020603050405020304" pitchFamily="18" charset="0"/>
+                <a:cs typeface="Times New Roman" panose="02020603050405020304" pitchFamily="18" charset="0"/>
+              </a:rPr>
+              <a:t>base)</a:t>
+            </a:r>
+          </a:p>
+          <a:p>
+            <a:r>
+              <a:rPr lang="en-US" sz="2000" dirty="0">
+                <a:latin typeface="Times New Roman" panose="02020603050405020304" pitchFamily="18" charset="0"/>
+                <a:cs typeface="Times New Roman" panose="02020603050405020304" pitchFamily="18" charset="0"/>
+              </a:rPr>
+              <a:t>Logarithms</a:t>
+            </a:r>
+            <a:r>
+              <a:rPr lang="zh-CN" altLang="en-US" sz="2000" dirty="0">
+                <a:latin typeface="Times New Roman" panose="02020603050405020304" pitchFamily="18" charset="0"/>
+                <a:cs typeface="Times New Roman" panose="02020603050405020304" pitchFamily="18" charset="0"/>
+              </a:rPr>
+              <a:t> </a:t>
+            </a:r>
+            <a:r>
+              <a:rPr lang="en-US" altLang="zh-CN" sz="2000" dirty="0">
+                <a:latin typeface="Times New Roman" panose="02020603050405020304" pitchFamily="18" charset="0"/>
+                <a:cs typeface="Times New Roman" panose="02020603050405020304" pitchFamily="18" charset="0"/>
+              </a:rPr>
+              <a:t>(of</a:t>
+            </a:r>
+            <a:r>
+              <a:rPr lang="zh-CN" altLang="en-US" sz="2000" dirty="0">
+                <a:latin typeface="Times New Roman" panose="02020603050405020304" pitchFamily="18" charset="0"/>
+                <a:cs typeface="Times New Roman" panose="02020603050405020304" pitchFamily="18" charset="0"/>
+              </a:rPr>
+              <a:t> </a:t>
+            </a:r>
+            <a:r>
+              <a:rPr lang="en-US" altLang="zh-CN" sz="2000" dirty="0">
+                <a:latin typeface="Times New Roman" panose="02020603050405020304" pitchFamily="18" charset="0"/>
+                <a:cs typeface="Times New Roman" panose="02020603050405020304" pitchFamily="18" charset="0"/>
+              </a:rPr>
+              <a:t>any</a:t>
+            </a:r>
+            <a:r>
+              <a:rPr lang="zh-CN" altLang="en-US" sz="2000" dirty="0">
+                <a:latin typeface="Times New Roman" panose="02020603050405020304" pitchFamily="18" charset="0"/>
+                <a:cs typeface="Times New Roman" panose="02020603050405020304" pitchFamily="18" charset="0"/>
+              </a:rPr>
+              <a:t> </a:t>
+            </a:r>
+            <a:r>
+              <a:rPr lang="en-US" altLang="zh-CN" sz="2000" dirty="0">
+                <a:latin typeface="Times New Roman" panose="02020603050405020304" pitchFamily="18" charset="0"/>
+                <a:cs typeface="Times New Roman" panose="02020603050405020304" pitchFamily="18" charset="0"/>
+              </a:rPr>
+              <a:t>base)</a:t>
+            </a:r>
+            <a:endParaRPr lang="en-US" sz="2000" dirty="0">
+              <a:latin typeface="Times New Roman" panose="02020603050405020304" pitchFamily="18" charset="0"/>
+              <a:cs typeface="Times New Roman" panose="02020603050405020304" pitchFamily="18" charset="0"/>
+            </a:endParaRPr>
+          </a:p>
+          <a:p>
+            <a:r>
+              <a:rPr lang="en-US" sz="2000" dirty="0">
+                <a:latin typeface="Times New Roman" panose="02020603050405020304" pitchFamily="18" charset="0"/>
+                <a:cs typeface="Times New Roman" panose="02020603050405020304" pitchFamily="18" charset="0"/>
+              </a:rPr>
+              <a:t>Square root</a:t>
+            </a:r>
+          </a:p>
+          <a:p>
+            <a:r>
+              <a:rPr lang="en-US" sz="2000" dirty="0">
+                <a:latin typeface="Times New Roman" panose="02020603050405020304" pitchFamily="18" charset="0"/>
+                <a:cs typeface="Times New Roman" panose="02020603050405020304" pitchFamily="18" charset="0"/>
+              </a:rPr>
+              <a:t>Logistic</a:t>
+            </a:r>
+            <a:r>
+              <a:rPr lang="zh-CN" altLang="en-US" sz="2000" dirty="0">
+                <a:latin typeface="Times New Roman" panose="02020603050405020304" pitchFamily="18" charset="0"/>
+                <a:cs typeface="Times New Roman" panose="02020603050405020304" pitchFamily="18" charset="0"/>
+              </a:rPr>
+              <a:t> </a:t>
+            </a:r>
+            <a:r>
+              <a:rPr lang="en-US" altLang="zh-CN" sz="2000" dirty="0">
+                <a:latin typeface="Times New Roman" panose="02020603050405020304" pitchFamily="18" charset="0"/>
+                <a:cs typeface="Times New Roman" panose="02020603050405020304" pitchFamily="18" charset="0"/>
+              </a:rPr>
+              <a:t>function</a:t>
+            </a:r>
+            <a:endParaRPr lang="en-US" sz="2000" dirty="0">
+              <a:latin typeface="Times New Roman" panose="02020603050405020304" pitchFamily="18" charset="0"/>
+              <a:cs typeface="Times New Roman" panose="02020603050405020304" pitchFamily="18" charset="0"/>
+            </a:endParaRPr>
+          </a:p>
+          <a:p>
+            <a:r>
+              <a:rPr lang="en-US" altLang="zh-CN" sz="2000" dirty="0">
+                <a:latin typeface="Times New Roman" panose="02020603050405020304" pitchFamily="18" charset="0"/>
+                <a:cs typeface="Times New Roman" panose="02020603050405020304" pitchFamily="18" charset="0"/>
+              </a:rPr>
+              <a:t>Comparison</a:t>
+            </a:r>
+            <a:r>
+              <a:rPr lang="zh-CN" altLang="en-US" sz="2000" dirty="0">
+                <a:latin typeface="Times New Roman" panose="02020603050405020304" pitchFamily="18" charset="0"/>
+                <a:cs typeface="Times New Roman" panose="02020603050405020304" pitchFamily="18" charset="0"/>
+              </a:rPr>
+              <a:t> </a:t>
+            </a:r>
+            <a:r>
+              <a:rPr lang="en-US" altLang="zh-CN" sz="2000" dirty="0">
+                <a:latin typeface="Times New Roman" panose="02020603050405020304" pitchFamily="18" charset="0"/>
+                <a:cs typeface="Times New Roman" panose="02020603050405020304" pitchFamily="18" charset="0"/>
+              </a:rPr>
+              <a:t>(equal</a:t>
+            </a:r>
+            <a:r>
+              <a:rPr lang="zh-CN" altLang="en-US" sz="2000" dirty="0">
+                <a:latin typeface="Times New Roman" panose="02020603050405020304" pitchFamily="18" charset="0"/>
+                <a:cs typeface="Times New Roman" panose="02020603050405020304" pitchFamily="18" charset="0"/>
+              </a:rPr>
+              <a:t> </a:t>
+            </a:r>
+            <a:r>
+              <a:rPr lang="en-US" altLang="zh-CN" sz="2000" dirty="0">
+                <a:latin typeface="Times New Roman" panose="02020603050405020304" pitchFamily="18" charset="0"/>
+                <a:cs typeface="Times New Roman" panose="02020603050405020304" pitchFamily="18" charset="0"/>
+              </a:rPr>
+              <a:t>&amp;</a:t>
+            </a:r>
+            <a:r>
+              <a:rPr lang="zh-CN" altLang="en-US" sz="2000" dirty="0">
+                <a:latin typeface="Times New Roman" panose="02020603050405020304" pitchFamily="18" charset="0"/>
+                <a:cs typeface="Times New Roman" panose="02020603050405020304" pitchFamily="18" charset="0"/>
+              </a:rPr>
+              <a:t> </a:t>
+            </a:r>
+            <a:r>
+              <a:rPr lang="en-US" altLang="zh-CN" sz="2000" dirty="0">
+                <a:latin typeface="Times New Roman" panose="02020603050405020304" pitchFamily="18" charset="0"/>
+                <a:cs typeface="Times New Roman" panose="02020603050405020304" pitchFamily="18" charset="0"/>
+              </a:rPr>
+              <a:t>not</a:t>
+            </a:r>
+            <a:r>
+              <a:rPr lang="zh-CN" altLang="en-US" sz="2000" dirty="0">
+                <a:latin typeface="Times New Roman" panose="02020603050405020304" pitchFamily="18" charset="0"/>
+                <a:cs typeface="Times New Roman" panose="02020603050405020304" pitchFamily="18" charset="0"/>
+              </a:rPr>
+              <a:t> </a:t>
+            </a:r>
+            <a:r>
+              <a:rPr lang="en-US" altLang="zh-CN" sz="2000" dirty="0">
+                <a:latin typeface="Times New Roman" panose="02020603050405020304" pitchFamily="18" charset="0"/>
+                <a:cs typeface="Times New Roman" panose="02020603050405020304" pitchFamily="18" charset="0"/>
+              </a:rPr>
+              <a:t>equal)</a:t>
+            </a:r>
+            <a:endParaRPr lang="en-US" sz="2000" dirty="0">
+              <a:latin typeface="Times New Roman" panose="02020603050405020304" pitchFamily="18" charset="0"/>
+              <a:cs typeface="Times New Roman" panose="02020603050405020304" pitchFamily="18" charset="0"/>
+            </a:endParaRPr>
+          </a:p>
+        </p:txBody>
+      </p:sp>
+      <p:sp>
+        <p:nvSpPr>
+          <p:cNvPr id="4" name="Rectangle 3">
+            <a:extLst>
+              <a:ext uri="{FF2B5EF4-FFF2-40B4-BE49-F238E27FC236}">
+                <a16:creationId xmlns:a16="http://schemas.microsoft.com/office/drawing/2014/main" id="{2499BD44-65F2-7B4C-8C07-AFE09FE5609F}"/>
+              </a:ext>
+            </a:extLst>
+          </p:cNvPr>
+          <p:cNvSpPr/>
+          <p:nvPr/>
+        </p:nvSpPr>
+        <p:spPr>
+          <a:xfrm>
+            <a:off x="10195560" y="642594"/>
+            <a:ext cx="1428750" cy="568986"/>
+          </a:xfrm>
+          <a:prstGeom prst="rect">
+            <a:avLst/>
+          </a:prstGeom>
+        </p:spPr>
+        <p:style>
+          <a:lnRef idx="2">
+            <a:schemeClr val="accent1">
+              <a:shade val="50000"/>
+            </a:schemeClr>
+          </a:lnRef>
+          <a:fillRef idx="1">
+            <a:schemeClr val="accent1"/>
+          </a:fillRef>
+          <a:effectRef idx="0">
+            <a:schemeClr val="accent1"/>
+          </a:effectRef>
+          <a:fontRef idx="minor">
+            <a:schemeClr val="lt1"/>
+          </a:fontRef>
+        </p:style>
+        <p:txBody>
+          <a:bodyPr rtlCol="0" anchor="ctr"/>
+          <a:lstStyle/>
+          <a:p>
+            <a:pPr algn="ctr"/>
+            <a:r>
+              <a:rPr lang="en-US" altLang="zh-CN" dirty="0"/>
+              <a:t>R</a:t>
+            </a:r>
+          </a:p>
         </p:txBody>
       </p:sp>
     </p:spTree>
     <p:extLst>
       <p:ext uri="{BB962C8B-B14F-4D97-AF65-F5344CB8AC3E}">
-        <p14:creationId xmlns:p14="http://schemas.microsoft.com/office/powerpoint/2010/main" val="1937995839"/>
+        <p14:creationId xmlns:p14="http://schemas.microsoft.com/office/powerpoint/2010/main" val="2023197500"/>
       </p:ext>
     </p:extLst>
   </p:cSld>
@@ -8565,7 +8838,7 @@
           <p:cNvPr id="2" name="Title 1">
             <a:extLst>
               <a:ext uri="{FF2B5EF4-FFF2-40B4-BE49-F238E27FC236}">
-                <a16:creationId xmlns:a16="http://schemas.microsoft.com/office/drawing/2014/main" id="{644EEA2C-D2BD-4B43-A8DB-7C5656984C99}"/>
+                <a16:creationId xmlns:a16="http://schemas.microsoft.com/office/drawing/2014/main" id="{2B5059BD-2BF5-6147-99F1-8FE6C03876C7}"/>
               </a:ext>
             </a:extLst>
           </p:cNvPr>
@@ -8576,7 +8849,12 @@
             <p:ph type="title"/>
           </p:nvPr>
         </p:nvSpPr>
-        <p:spPr/>
+        <p:spPr>
+          <a:xfrm>
+            <a:off x="1066800" y="642594"/>
+            <a:ext cx="10058400" cy="1371600"/>
+          </a:xfrm>
+        </p:spPr>
         <p:txBody>
           <a:bodyPr/>
           <a:lstStyle/>
@@ -8586,7 +8864,7 @@
                 <a:latin typeface="Times New Roman" panose="02020603050405020304" pitchFamily="18" charset="0"/>
                 <a:cs typeface="Times New Roman" panose="02020603050405020304" pitchFamily="18" charset="0"/>
               </a:rPr>
-              <a:t>Additional</a:t>
+              <a:t>How</a:t>
             </a:r>
             <a:r>
               <a:rPr lang="zh-CN" altLang="en-US" dirty="0">
@@ -8600,7 +8878,7 @@
                 <a:latin typeface="Times New Roman" panose="02020603050405020304" pitchFamily="18" charset="0"/>
                 <a:cs typeface="Times New Roman" panose="02020603050405020304" pitchFamily="18" charset="0"/>
               </a:rPr>
-              <a:t>Features</a:t>
+              <a:t>to</a:t>
             </a:r>
             <a:r>
               <a:rPr lang="zh-CN" altLang="en-US" dirty="0">
@@ -8610,6 +8888,13 @@
               <a:t> </a:t>
             </a:r>
             <a:r>
+              <a:rPr lang="en-US" altLang="zh-CN" dirty="0">
+                <a:latin typeface="Times New Roman" panose="02020603050405020304" pitchFamily="18" charset="0"/>
+                <a:cs typeface="Times New Roman" panose="02020603050405020304" pitchFamily="18" charset="0"/>
+              </a:rPr>
+              <a:t>Use</a:t>
+            </a:r>
+            <a:r>
               <a:rPr lang="en-US" altLang="zh-CN" b="0" dirty="0">
                 <a:latin typeface="Times New Roman" panose="02020603050405020304" pitchFamily="18" charset="0"/>
                 <a:cs typeface="Times New Roman" panose="02020603050405020304" pitchFamily="18" charset="0"/>
@@ -8628,7 +8913,7 @@
                 <a:latin typeface="Times New Roman" panose="02020603050405020304" pitchFamily="18" charset="0"/>
                 <a:cs typeface="Times New Roman" panose="02020603050405020304" pitchFamily="18" charset="0"/>
               </a:rPr>
-              <a:t>Reverse</a:t>
+              <a:t>Code</a:t>
             </a:r>
             <a:r>
               <a:rPr lang="zh-CN" altLang="en-US" b="0" dirty="0">
@@ -8642,7 +8927,7 @@
                 <a:latin typeface="Times New Roman" panose="02020603050405020304" pitchFamily="18" charset="0"/>
                 <a:cs typeface="Times New Roman" panose="02020603050405020304" pitchFamily="18" charset="0"/>
               </a:rPr>
-              <a:t>Mode</a:t>
+              <a:t>Demo</a:t>
             </a:r>
             <a:endParaRPr lang="en-US" b="0" dirty="0">
               <a:latin typeface="Times New Roman" panose="02020603050405020304" pitchFamily="18" charset="0"/>
@@ -8656,7 +8941,7 @@
           <p:cNvPr id="3" name="Content Placeholder 2">
             <a:extLst>
               <a:ext uri="{FF2B5EF4-FFF2-40B4-BE49-F238E27FC236}">
-                <a16:creationId xmlns:a16="http://schemas.microsoft.com/office/drawing/2014/main" id="{D5E7C10C-F3F8-AA48-AE6A-6B761BCD68B7}"/>
+                <a16:creationId xmlns:a16="http://schemas.microsoft.com/office/drawing/2014/main" id="{15D52ADB-10FF-2949-9464-0909D6AE14F4}"/>
               </a:ext>
             </a:extLst>
           </p:cNvPr>
@@ -8669,17 +8954,147 @@
         </p:nvSpPr>
         <p:spPr/>
         <p:txBody>
-          <a:bodyPr/>
+          <a:bodyPr>
+            <a:normAutofit/>
+          </a:bodyPr>
           <a:lstStyle/>
           <a:p>
-            <a:endParaRPr lang="en-US" dirty="0"/>
+            <a:r>
+              <a:rPr lang="en-US" sz="2000" dirty="0">
+                <a:latin typeface="Times New Roman" panose="02020603050405020304" pitchFamily="18" charset="0"/>
+                <a:cs typeface="Times New Roman" panose="02020603050405020304" pitchFamily="18" charset="0"/>
+              </a:rPr>
+              <a:t>x = Ad_Var(</a:t>
+            </a:r>
+            <a:r>
+              <a:rPr lang="en-US" altLang="zh-CN" sz="2000" dirty="0">
+                <a:latin typeface="Times New Roman" panose="02020603050405020304" pitchFamily="18" charset="0"/>
+                <a:cs typeface="Times New Roman" panose="02020603050405020304" pitchFamily="18" charset="0"/>
+              </a:rPr>
+              <a:t>2</a:t>
+            </a:r>
+            <a:r>
+              <a:rPr lang="en-US" sz="2000" dirty="0">
+                <a:latin typeface="Times New Roman" panose="02020603050405020304" pitchFamily="18" charset="0"/>
+                <a:cs typeface="Times New Roman" panose="02020603050405020304" pitchFamily="18" charset="0"/>
+              </a:rPr>
+              <a:t>)</a:t>
+            </a:r>
+          </a:p>
+          <a:p>
+            <a:r>
+              <a:rPr lang="en-US" sz="2000" dirty="0">
+                <a:latin typeface="Times New Roman" panose="02020603050405020304" pitchFamily="18" charset="0"/>
+                <a:cs typeface="Times New Roman" panose="02020603050405020304" pitchFamily="18" charset="0"/>
+              </a:rPr>
+              <a:t>f = (Ad_Var.sin(2*x))**2</a:t>
+            </a:r>
+          </a:p>
+          <a:p>
+            <a:r>
+              <a:rPr lang="en-US" sz="2000" dirty="0">
+                <a:latin typeface="Times New Roman" panose="02020603050405020304" pitchFamily="18" charset="0"/>
+                <a:cs typeface="Times New Roman" panose="02020603050405020304" pitchFamily="18" charset="0"/>
+              </a:rPr>
+              <a:t>print</a:t>
+            </a:r>
+            <a:r>
+              <a:rPr lang="zh-CN" altLang="en-US" sz="2000" dirty="0">
+                <a:latin typeface="Times New Roman" panose="02020603050405020304" pitchFamily="18" charset="0"/>
+                <a:cs typeface="Times New Roman" panose="02020603050405020304" pitchFamily="18" charset="0"/>
+              </a:rPr>
+              <a:t> </a:t>
+            </a:r>
+            <a:r>
+              <a:rPr lang="en-US" sz="2000" dirty="0">
+                <a:latin typeface="Times New Roman" panose="02020603050405020304" pitchFamily="18" charset="0"/>
+                <a:cs typeface="Times New Roman" panose="02020603050405020304" pitchFamily="18" charset="0"/>
+              </a:rPr>
+              <a:t>(f.get_val(), f.get_ders())</a:t>
+            </a:r>
+          </a:p>
+          <a:p>
+            <a:r>
+              <a:rPr lang="en-US" altLang="zh-CN" sz="2000" dirty="0">
+                <a:latin typeface="Times New Roman" panose="02020603050405020304" pitchFamily="18" charset="0"/>
+                <a:cs typeface="Times New Roman" panose="02020603050405020304" pitchFamily="18" charset="0"/>
+              </a:rPr>
+              <a:t>&gt;&gt;&gt;﻿</a:t>
+            </a:r>
+            <a:r>
+              <a:rPr lang="zh-CN" altLang="en-US" sz="2000" dirty="0">
+                <a:latin typeface="Times New Roman" panose="02020603050405020304" pitchFamily="18" charset="0"/>
+                <a:cs typeface="Times New Roman" panose="02020603050405020304" pitchFamily="18" charset="0"/>
+              </a:rPr>
+              <a:t> </a:t>
+            </a:r>
+            <a:r>
+              <a:rPr lang="en-US" altLang="zh-CN" sz="2000" dirty="0">
+                <a:latin typeface="Times New Roman" panose="02020603050405020304" pitchFamily="18" charset="0"/>
+                <a:cs typeface="Times New Roman" panose="02020603050405020304" pitchFamily="18" charset="0"/>
+              </a:rPr>
+              <a:t>0.5727500169043067 1.9787164932467636</a:t>
+            </a:r>
+            <a:endParaRPr lang="en-US" sz="2000" dirty="0">
+              <a:latin typeface="Times New Roman" panose="02020603050405020304" pitchFamily="18" charset="0"/>
+              <a:cs typeface="Times New Roman" panose="02020603050405020304" pitchFamily="18" charset="0"/>
+            </a:endParaRPr>
+          </a:p>
+        </p:txBody>
+      </p:sp>
+      <p:sp>
+        <p:nvSpPr>
+          <p:cNvPr id="4" name="Rectangle 3">
+            <a:extLst>
+              <a:ext uri="{FF2B5EF4-FFF2-40B4-BE49-F238E27FC236}">
+                <a16:creationId xmlns:a16="http://schemas.microsoft.com/office/drawing/2014/main" id="{3A24C046-B146-AD46-851E-8C5EA8D2BF28}"/>
+              </a:ext>
+            </a:extLst>
+          </p:cNvPr>
+          <p:cNvSpPr/>
+          <p:nvPr/>
+        </p:nvSpPr>
+        <p:spPr>
+          <a:xfrm>
+            <a:off x="10195560" y="642594"/>
+            <a:ext cx="1428750" cy="568986"/>
+          </a:xfrm>
+          <a:prstGeom prst="rect">
+            <a:avLst/>
+          </a:prstGeom>
+        </p:spPr>
+        <p:style>
+          <a:lnRef idx="2">
+            <a:schemeClr val="accent1">
+              <a:shade val="50000"/>
+            </a:schemeClr>
+          </a:lnRef>
+          <a:fillRef idx="1">
+            <a:schemeClr val="accent1"/>
+          </a:fillRef>
+          <a:effectRef idx="0">
+            <a:schemeClr val="accent1"/>
+          </a:effectRef>
+          <a:fontRef idx="minor">
+            <a:schemeClr val="lt1"/>
+          </a:fontRef>
+        </p:style>
+        <p:txBody>
+          <a:bodyPr rtlCol="0" anchor="ctr"/>
+          <a:lstStyle/>
+          <a:p>
+            <a:pPr algn="ctr"/>
+            <a:r>
+              <a:rPr lang="en-US" altLang="zh-CN" dirty="0"/>
+              <a:t>R</a:t>
+            </a:r>
           </a:p>
         </p:txBody>
       </p:sp>
     </p:spTree>
     <p:extLst>
       <p:ext uri="{BB962C8B-B14F-4D97-AF65-F5344CB8AC3E}">
-        <p14:creationId xmlns:p14="http://schemas.microsoft.com/office/powerpoint/2010/main" val="3753320448"/>
+        <p14:creationId xmlns:p14="http://schemas.microsoft.com/office/powerpoint/2010/main" val="1937995839"/>
       </p:ext>
     </p:extLst>
   </p:cSld>
@@ -8711,7 +9126,7 @@
           <p:cNvPr id="2" name="Title 1">
             <a:extLst>
               <a:ext uri="{FF2B5EF4-FFF2-40B4-BE49-F238E27FC236}">
-                <a16:creationId xmlns:a16="http://schemas.microsoft.com/office/drawing/2014/main" id="{2B5059BD-2BF5-6147-99F1-8FE6C03876C7}"/>
+                <a16:creationId xmlns:a16="http://schemas.microsoft.com/office/drawing/2014/main" id="{644EEA2C-D2BD-4B43-A8DB-7C5656984C99}"/>
               </a:ext>
             </a:extLst>
           </p:cNvPr>
@@ -8722,12 +9137,7 @@
             <p:ph type="title"/>
           </p:nvPr>
         </p:nvSpPr>
-        <p:spPr>
-          <a:xfrm>
-            <a:off x="1066800" y="642594"/>
-            <a:ext cx="10058400" cy="1371600"/>
-          </a:xfrm>
-        </p:spPr>
+        <p:spPr/>
         <p:txBody>
           <a:bodyPr/>
           <a:lstStyle/>
@@ -8807,7 +9217,7 @@
           <p:cNvPr id="3" name="Content Placeholder 2">
             <a:extLst>
               <a:ext uri="{FF2B5EF4-FFF2-40B4-BE49-F238E27FC236}">
-                <a16:creationId xmlns:a16="http://schemas.microsoft.com/office/drawing/2014/main" id="{15D52ADB-10FF-2949-9464-0909D6AE14F4}"/>
+                <a16:creationId xmlns:a16="http://schemas.microsoft.com/office/drawing/2014/main" id="{D5E7C10C-F3F8-AA48-AE6A-6B761BCD68B7}"/>
               </a:ext>
             </a:extLst>
           </p:cNvPr>
@@ -8827,10 +9237,59 @@
           </a:p>
         </p:txBody>
       </p:sp>
+      <p:sp>
+        <p:nvSpPr>
+          <p:cNvPr id="4" name="Rectangle 3">
+            <a:extLst>
+              <a:ext uri="{FF2B5EF4-FFF2-40B4-BE49-F238E27FC236}">
+                <a16:creationId xmlns:a16="http://schemas.microsoft.com/office/drawing/2014/main" id="{4A2BD1AA-550A-834F-AFB5-BE4772DECDDB}"/>
+              </a:ext>
+            </a:extLst>
+          </p:cNvPr>
+          <p:cNvSpPr/>
+          <p:nvPr/>
+        </p:nvSpPr>
+        <p:spPr>
+          <a:xfrm>
+            <a:off x="10195560" y="642594"/>
+            <a:ext cx="1428750" cy="568986"/>
+          </a:xfrm>
+          <a:prstGeom prst="rect">
+            <a:avLst/>
+          </a:prstGeom>
+        </p:spPr>
+        <p:style>
+          <a:lnRef idx="2">
+            <a:schemeClr val="accent1">
+              <a:shade val="50000"/>
+            </a:schemeClr>
+          </a:lnRef>
+          <a:fillRef idx="1">
+            <a:schemeClr val="accent1"/>
+          </a:fillRef>
+          <a:effectRef idx="0">
+            <a:schemeClr val="accent1"/>
+          </a:effectRef>
+          <a:fontRef idx="minor">
+            <a:schemeClr val="lt1"/>
+          </a:fontRef>
+        </p:style>
+        <p:txBody>
+          <a:bodyPr rtlCol="0" anchor="ctr"/>
+          <a:lstStyle/>
+          <a:p>
+            <a:pPr algn="ctr"/>
+            <a:r>
+              <a:rPr lang="en-US" altLang="zh-CN" dirty="0"/>
+              <a:t>M</a:t>
+            </a:r>
+          </a:p>
+        </p:txBody>
+      </p:sp>
     </p:spTree>
     <p:extLst>
       <p:ext uri="{BB962C8B-B14F-4D97-AF65-F5344CB8AC3E}">
-        <p14:creationId xmlns:p14="http://schemas.microsoft.com/office/powerpoint/2010/main" val="2657746539"/>
+        <p14:creationId xmlns:p14="http://schemas.microsoft.com/office/powerpoint/2010/main" val="3753320448"/>
       </p:ext>
     </p:extLst>
   </p:cSld>
@@ -8862,7 +9321,7 @@
           <p:cNvPr id="2" name="Title 1">
             <a:extLst>
               <a:ext uri="{FF2B5EF4-FFF2-40B4-BE49-F238E27FC236}">
-                <a16:creationId xmlns:a16="http://schemas.microsoft.com/office/drawing/2014/main" id="{95589287-AF11-704C-81C5-4585F66010A7}"/>
+                <a16:creationId xmlns:a16="http://schemas.microsoft.com/office/drawing/2014/main" id="{2B5059BD-2BF5-6147-99F1-8FE6C03876C7}"/>
               </a:ext>
             </a:extLst>
           </p:cNvPr>
@@ -8873,7 +9332,12 @@
             <p:ph type="title"/>
           </p:nvPr>
         </p:nvSpPr>
-        <p:spPr/>
+        <p:spPr>
+          <a:xfrm>
+            <a:off x="1066800" y="642594"/>
+            <a:ext cx="10058400" cy="1371600"/>
+          </a:xfrm>
+        </p:spPr>
         <p:txBody>
           <a:bodyPr/>
           <a:lstStyle/>
@@ -8883,7 +9347,7 @@
                 <a:latin typeface="Times New Roman" panose="02020603050405020304" pitchFamily="18" charset="0"/>
                 <a:cs typeface="Times New Roman" panose="02020603050405020304" pitchFamily="18" charset="0"/>
               </a:rPr>
-              <a:t>Future</a:t>
+              <a:t>Additional</a:t>
             </a:r>
             <a:r>
               <a:rPr lang="zh-CN" altLang="en-US" dirty="0">
@@ -8897,9 +9361,51 @@
                 <a:latin typeface="Times New Roman" panose="02020603050405020304" pitchFamily="18" charset="0"/>
                 <a:cs typeface="Times New Roman" panose="02020603050405020304" pitchFamily="18" charset="0"/>
               </a:rPr>
-              <a:t>extensions</a:t>
-            </a:r>
-            <a:endParaRPr lang="en-US" dirty="0">
+              <a:t>Features</a:t>
+            </a:r>
+            <a:r>
+              <a:rPr lang="zh-CN" altLang="en-US" dirty="0">
+                <a:latin typeface="Times New Roman" panose="02020603050405020304" pitchFamily="18" charset="0"/>
+                <a:cs typeface="Times New Roman" panose="02020603050405020304" pitchFamily="18" charset="0"/>
+              </a:rPr>
+              <a:t> </a:t>
+            </a:r>
+            <a:r>
+              <a:rPr lang="en-US" altLang="zh-CN" b="0" dirty="0">
+                <a:latin typeface="Times New Roman" panose="02020603050405020304" pitchFamily="18" charset="0"/>
+                <a:cs typeface="Times New Roman" panose="02020603050405020304" pitchFamily="18" charset="0"/>
+              </a:rPr>
+              <a:t>–</a:t>
+            </a:r>
+            <a:r>
+              <a:rPr lang="zh-CN" altLang="en-US" b="0" dirty="0">
+                <a:latin typeface="Times New Roman" panose="02020603050405020304" pitchFamily="18" charset="0"/>
+                <a:cs typeface="Times New Roman" panose="02020603050405020304" pitchFamily="18" charset="0"/>
+              </a:rPr>
+              <a:t> </a:t>
+            </a:r>
+            <a:r>
+              <a:rPr lang="en-US" altLang="zh-CN" b="0" dirty="0">
+                <a:latin typeface="Times New Roman" panose="02020603050405020304" pitchFamily="18" charset="0"/>
+                <a:cs typeface="Times New Roman" panose="02020603050405020304" pitchFamily="18" charset="0"/>
+              </a:rPr>
+              <a:t>Reverse</a:t>
+            </a:r>
+            <a:r>
+              <a:rPr lang="zh-CN" altLang="en-US" b="0" dirty="0">
+                <a:latin typeface="Times New Roman" panose="02020603050405020304" pitchFamily="18" charset="0"/>
+                <a:cs typeface="Times New Roman" panose="02020603050405020304" pitchFamily="18" charset="0"/>
+              </a:rPr>
+              <a:t> </a:t>
+            </a:r>
+            <a:r>
+              <a:rPr lang="en-US" altLang="zh-CN" b="0" dirty="0">
+                <a:latin typeface="Times New Roman" panose="02020603050405020304" pitchFamily="18" charset="0"/>
+                <a:cs typeface="Times New Roman" panose="02020603050405020304" pitchFamily="18" charset="0"/>
+              </a:rPr>
+              <a:t>Mode</a:t>
+            </a:r>
+            <a:endParaRPr lang="en-US" b="0" dirty="0">
               <a:latin typeface="Times New Roman" panose="02020603050405020304" pitchFamily="18" charset="0"/>
               <a:cs typeface="Times New Roman" panose="02020603050405020304" pitchFamily="18" charset="0"/>
             </a:endParaRPr>
@@ -8911,7 +9417,7 @@
           <p:cNvPr id="3" name="Content Placeholder 2">
             <a:extLst>
               <a:ext uri="{FF2B5EF4-FFF2-40B4-BE49-F238E27FC236}">
-                <a16:creationId xmlns:a16="http://schemas.microsoft.com/office/drawing/2014/main" id="{783E8868-7E39-C445-AF4E-AFEA995FD1B2}"/>
+                <a16:creationId xmlns:a16="http://schemas.microsoft.com/office/drawing/2014/main" id="{15D52ADB-10FF-2949-9464-0909D6AE14F4}"/>
               </a:ext>
             </a:extLst>
           </p:cNvPr>
@@ -8931,10 +9437,59 @@
           </a:p>
         </p:txBody>
       </p:sp>
+      <p:sp>
+        <p:nvSpPr>
+          <p:cNvPr id="4" name="Rectangle 3">
+            <a:extLst>
+              <a:ext uri="{FF2B5EF4-FFF2-40B4-BE49-F238E27FC236}">
+                <a16:creationId xmlns:a16="http://schemas.microsoft.com/office/drawing/2014/main" id="{0E1A4204-E5C5-2D4D-9FCF-1F552919258D}"/>
+              </a:ext>
+            </a:extLst>
+          </p:cNvPr>
+          <p:cNvSpPr/>
+          <p:nvPr/>
+        </p:nvSpPr>
+        <p:spPr>
+          <a:xfrm>
+            <a:off x="10195560" y="642594"/>
+            <a:ext cx="1428750" cy="568986"/>
+          </a:xfrm>
+          <a:prstGeom prst="rect">
+            <a:avLst/>
+          </a:prstGeom>
+        </p:spPr>
+        <p:style>
+          <a:lnRef idx="2">
+            <a:schemeClr val="accent1">
+              <a:shade val="50000"/>
+            </a:schemeClr>
+          </a:lnRef>
+          <a:fillRef idx="1">
+            <a:schemeClr val="accent1"/>
+          </a:fillRef>
+          <a:effectRef idx="0">
+            <a:schemeClr val="accent1"/>
+          </a:effectRef>
+          <a:fontRef idx="minor">
+            <a:schemeClr val="lt1"/>
+          </a:fontRef>
+        </p:style>
+        <p:txBody>
+          <a:bodyPr rtlCol="0" anchor="ctr"/>
+          <a:lstStyle/>
+          <a:p>
+            <a:pPr algn="ctr"/>
+            <a:r>
+              <a:rPr lang="en-US" altLang="zh-CN" dirty="0"/>
+              <a:t>M</a:t>
+            </a:r>
+          </a:p>
+        </p:txBody>
+      </p:sp>
     </p:spTree>
     <p:extLst>
       <p:ext uri="{BB962C8B-B14F-4D97-AF65-F5344CB8AC3E}">
-        <p14:creationId xmlns:p14="http://schemas.microsoft.com/office/powerpoint/2010/main" val="663471589"/>
+        <p14:creationId xmlns:p14="http://schemas.microsoft.com/office/powerpoint/2010/main" val="2657746539"/>
       </p:ext>
     </p:extLst>
   </p:cSld>

</xml_diff>